<commit_message>
courseware and video updates
</commit_message>
<xml_diff>
--- a/VideoSessionsMaterials/v11-player-module.pptx
+++ b/VideoSessionsMaterials/v11-player-module.pptx
@@ -5,7 +5,7 @@
     <p:sldMasterId id="2147483648" r:id="rId1"/>
   </p:sldMasterIdLst>
   <p:notesMasterIdLst>
-    <p:notesMasterId r:id="rId10"/>
+    <p:notesMasterId r:id="rId13"/>
   </p:notesMasterIdLst>
   <p:sldIdLst>
     <p:sldId id="360" r:id="rId2"/>
@@ -14,8 +14,11 @@
     <p:sldId id="280" r:id="rId5"/>
     <p:sldId id="281" r:id="rId6"/>
     <p:sldId id="363" r:id="rId7"/>
-    <p:sldId id="343" r:id="rId8"/>
-    <p:sldId id="322" r:id="rId9"/>
+    <p:sldId id="365" r:id="rId8"/>
+    <p:sldId id="366" r:id="rId9"/>
+    <p:sldId id="343" r:id="rId10"/>
+    <p:sldId id="364" r:id="rId11"/>
+    <p:sldId id="322" r:id="rId12"/>
   </p:sldIdLst>
   <p:sldSz cx="17327563" cy="9747250"/>
   <p:notesSz cx="6858000" cy="9144000"/>
@@ -230,7 +233,7 @@
             <a:fld id="{DDC063FE-8627-9A42-970F-0BBEEB02B587}" type="datetimeFigureOut">
               <a:rPr lang="en-US" smtClean="0"/>
               <a:pPr/>
-              <a:t>11/26/13</a:t>
+              <a:t>12/3/13</a:t>
             </a:fld>
             <a:endParaRPr lang="en-US" dirty="0"/>
           </a:p>
@@ -518,7 +521,92 @@
       </p:grpSpPr>
       <p:sp>
         <p:nvSpPr>
-          <p:cNvPr id="306177" name="Rectangle 7"/>
+          <p:cNvPr id="2" name="Slide Image Placeholder 1"/>
+          <p:cNvSpPr>
+            <a:spLocks noGrp="1" noRot="1" noChangeAspect="1"/>
+          </p:cNvSpPr>
+          <p:nvPr>
+            <p:ph type="sldImg"/>
+          </p:nvPr>
+        </p:nvSpPr>
+        <p:spPr/>
+      </p:sp>
+      <p:sp>
+        <p:nvSpPr>
+          <p:cNvPr id="3" name="Notes Placeholder 2"/>
+          <p:cNvSpPr>
+            <a:spLocks noGrp="1"/>
+          </p:cNvSpPr>
+          <p:nvPr>
+            <p:ph type="body" idx="1"/>
+          </p:nvPr>
+        </p:nvSpPr>
+        <p:spPr/>
+        <p:txBody>
+          <a:bodyPr/>
+          <a:lstStyle/>
+          <a:p>
+            <a:endParaRPr lang="en-US"/>
+          </a:p>
+        </p:txBody>
+      </p:sp>
+      <p:sp>
+        <p:nvSpPr>
+          <p:cNvPr id="4" name="Slide Number Placeholder 3"/>
+          <p:cNvSpPr>
+            <a:spLocks noGrp="1"/>
+          </p:cNvSpPr>
+          <p:nvPr>
+            <p:ph type="sldNum" sz="quarter" idx="10"/>
+          </p:nvPr>
+        </p:nvSpPr>
+        <p:spPr/>
+        <p:txBody>
+          <a:bodyPr/>
+          <a:lstStyle/>
+          <a:p>
+            <a:fld id="{3560C2FB-C494-1A46-A471-884A4E75440F}" type="slidenum">
+              <a:rPr lang="en-US" smtClean="0"/>
+              <a:pPr/>
+              <a:t>1</a:t>
+            </a:fld>
+            <a:endParaRPr lang="en-US" dirty="0"/>
+          </a:p>
+        </p:txBody>
+      </p:sp>
+    </p:spTree>
+    <p:extLst>
+      <p:ext uri="{BB962C8B-B14F-4D97-AF65-F5344CB8AC3E}">
+        <p14:creationId xmlns:p14="http://schemas.microsoft.com/office/powerpoint/2010/main" val="1188271887"/>
+      </p:ext>
+    </p:extLst>
+  </p:cSld>
+  <p:clrMapOvr>
+    <a:masterClrMapping/>
+  </p:clrMapOvr>
+</p:notes>
+</file>
+
+<file path=ppt/notesSlides/notesSlide10.xml><?xml version="1.0" encoding="utf-8"?>
+<p:notes xmlns:a="http://schemas.openxmlformats.org/drawingml/2006/main" xmlns:r="http://schemas.openxmlformats.org/officeDocument/2006/relationships" xmlns:p="http://schemas.openxmlformats.org/presentationml/2006/main">
+  <p:cSld>
+    <p:spTree>
+      <p:nvGrpSpPr>
+        <p:cNvPr id="1" name=""/>
+        <p:cNvGrpSpPr/>
+        <p:nvPr/>
+      </p:nvGrpSpPr>
+      <p:grpSpPr>
+        <a:xfrm>
+          <a:off x="0" y="0"/>
+          <a:ext cx="0" cy="0"/>
+          <a:chOff x="0" y="0"/>
+          <a:chExt cx="0" cy="0"/>
+        </a:xfrm>
+      </p:grpSpPr>
+      <p:sp>
+        <p:nvSpPr>
+          <p:cNvPr id="304129" name="Rectangle 7"/>
           <p:cNvSpPr txBox="1">
             <a:spLocks noGrp="1" noChangeArrowheads="1"/>
           </p:cNvSpPr>
@@ -546,7 +634,7 @@
             <a:pPr algn="r" eaLnBrk="0" hangingPunct="0">
               <a:defRPr/>
             </a:pPr>
-            <a:fld id="{491D0A6B-B391-486F-AC19-5E1A2977C5B7}" type="slidenum">
+            <a:fld id="{5639B2D1-4F62-47BF-B141-83C0868A9AB5}" type="slidenum">
               <a:rPr lang="en-US" sz="1200">
                 <a:ea typeface="ＭＳ Ｐゴシック" pitchFamily="34" charset="-128"/>
                 <a:cs typeface="+mn-cs"/>
@@ -554,7 +642,7 @@
               <a:pPr algn="r" eaLnBrk="0" hangingPunct="0">
                 <a:defRPr/>
               </a:pPr>
-              <a:t>2</a:t>
+              <a:t>10</a:t>
             </a:fld>
             <a:endParaRPr lang="en-US" sz="1200" dirty="0">
               <a:ea typeface="ＭＳ Ｐゴシック" pitchFamily="34" charset="-128"/>
@@ -565,7 +653,7 @@
       </p:sp>
       <p:sp>
         <p:nvSpPr>
-          <p:cNvPr id="101378" name="Rectangle 2"/>
+          <p:cNvPr id="97282" name="Rectangle 2"/>
           <p:cNvSpPr>
             <a:spLocks noGrp="1" noRot="1" noChangeAspect="1" noChangeArrowheads="1" noTextEdit="1"/>
           </p:cNvSpPr>
@@ -579,7 +667,7 @@
       </p:sp>
       <p:sp>
         <p:nvSpPr>
-          <p:cNvPr id="101379" name="Rectangle 3"/>
+          <p:cNvPr id="97283" name="Rectangle 3"/>
           <p:cNvSpPr>
             <a:spLocks noGrp="1" noChangeArrowheads="1"/>
           </p:cNvSpPr>
@@ -596,40 +684,98 @@
           <a:lstStyle/>
           <a:p>
             <a:pPr eaLnBrk="1" hangingPunct="1"/>
-            <a:r>
-              <a:rPr lang="en-US" dirty="0" smtClean="0">
-                <a:ea typeface="ＭＳ Ｐゴシック"/>
-              </a:rPr>
-              <a:t>Started at 1:43 </a:t>
-            </a:r>
-          </a:p>
-          <a:p>
-            <a:pPr eaLnBrk="1" hangingPunct="1"/>
-            <a:r>
-              <a:rPr lang="en-US" dirty="0" smtClean="0">
-                <a:ea typeface="ＭＳ Ｐゴシック"/>
-              </a:rPr>
-              <a:t>10 minutes for this exercise</a:t>
-            </a:r>
-          </a:p>
-          <a:p>
-            <a:pPr eaLnBrk="1" hangingPunct="1"/>
             <a:endParaRPr lang="en-US" dirty="0" smtClean="0">
               <a:ea typeface="ＭＳ Ｐゴシック"/>
             </a:endParaRPr>
           </a:p>
-          <a:p>
-            <a:pPr eaLnBrk="1" hangingPunct="1"/>
-            <a:r>
-              <a:rPr lang="en-US" dirty="0" smtClean="0">
-                <a:ea typeface="ＭＳ Ｐゴシック"/>
-              </a:rPr>
-              <a:t>1:50 it started</a:t>
-            </a:r>
-          </a:p>
         </p:txBody>
       </p:sp>
     </p:spTree>
+  </p:cSld>
+  <p:clrMapOvr>
+    <a:masterClrMapping/>
+  </p:clrMapOvr>
+</p:notes>
+</file>
+
+<file path=ppt/notesSlides/notesSlide11.xml><?xml version="1.0" encoding="utf-8"?>
+<p:notes xmlns:a="http://schemas.openxmlformats.org/drawingml/2006/main" xmlns:r="http://schemas.openxmlformats.org/officeDocument/2006/relationships" xmlns:p="http://schemas.openxmlformats.org/presentationml/2006/main">
+  <p:cSld>
+    <p:spTree>
+      <p:nvGrpSpPr>
+        <p:cNvPr id="1" name=""/>
+        <p:cNvGrpSpPr/>
+        <p:nvPr/>
+      </p:nvGrpSpPr>
+      <p:grpSpPr>
+        <a:xfrm>
+          <a:off x="0" y="0"/>
+          <a:ext cx="0" cy="0"/>
+          <a:chOff x="0" y="0"/>
+          <a:chExt cx="0" cy="0"/>
+        </a:xfrm>
+      </p:grpSpPr>
+      <p:sp>
+        <p:nvSpPr>
+          <p:cNvPr id="2" name="Slide Image Placeholder 1"/>
+          <p:cNvSpPr>
+            <a:spLocks noGrp="1" noRot="1" noChangeAspect="1"/>
+          </p:cNvSpPr>
+          <p:nvPr>
+            <p:ph type="sldImg"/>
+          </p:nvPr>
+        </p:nvSpPr>
+        <p:spPr/>
+      </p:sp>
+      <p:sp>
+        <p:nvSpPr>
+          <p:cNvPr id="3" name="Notes Placeholder 2"/>
+          <p:cNvSpPr>
+            <a:spLocks noGrp="1"/>
+          </p:cNvSpPr>
+          <p:nvPr>
+            <p:ph type="body" idx="1"/>
+          </p:nvPr>
+        </p:nvSpPr>
+        <p:spPr/>
+        <p:txBody>
+          <a:bodyPr/>
+          <a:lstStyle/>
+          <a:p>
+            <a:endParaRPr lang="en-US"/>
+          </a:p>
+        </p:txBody>
+      </p:sp>
+      <p:sp>
+        <p:nvSpPr>
+          <p:cNvPr id="4" name="Slide Number Placeholder 3"/>
+          <p:cNvSpPr>
+            <a:spLocks noGrp="1"/>
+          </p:cNvSpPr>
+          <p:nvPr>
+            <p:ph type="sldNum" sz="quarter" idx="10"/>
+          </p:nvPr>
+        </p:nvSpPr>
+        <p:spPr/>
+        <p:txBody>
+          <a:bodyPr/>
+          <a:lstStyle/>
+          <a:p>
+            <a:fld id="{3560C2FB-C494-1A46-A471-884A4E75440F}" type="slidenum">
+              <a:rPr lang="en-US" smtClean="0"/>
+              <a:pPr/>
+              <a:t>11</a:t>
+            </a:fld>
+            <a:endParaRPr lang="en-US" dirty="0"/>
+          </a:p>
+        </p:txBody>
+      </p:sp>
+    </p:spTree>
+    <p:extLst>
+      <p:ext uri="{BB962C8B-B14F-4D97-AF65-F5344CB8AC3E}">
+        <p14:creationId xmlns:p14="http://schemas.microsoft.com/office/powerpoint/2010/main" val="1657404094"/>
+      </p:ext>
+    </p:extLst>
   </p:cSld>
   <p:clrMapOvr>
     <a:masterClrMapping/>
@@ -656,7 +802,7 @@
       </p:grpSpPr>
       <p:sp>
         <p:nvSpPr>
-          <p:cNvPr id="285697" name="Rectangle 7"/>
+          <p:cNvPr id="306177" name="Rectangle 7"/>
           <p:cNvSpPr txBox="1">
             <a:spLocks noGrp="1" noChangeArrowheads="1"/>
           </p:cNvSpPr>
@@ -684,7 +830,7 @@
             <a:pPr algn="r" eaLnBrk="0" hangingPunct="0">
               <a:defRPr/>
             </a:pPr>
-            <a:fld id="{41521DE7-EAC0-4C1C-86CF-F63E9F89FC7D}" type="slidenum">
+            <a:fld id="{491D0A6B-B391-486F-AC19-5E1A2977C5B7}" type="slidenum">
               <a:rPr lang="en-US" sz="1200">
                 <a:ea typeface="ＭＳ Ｐゴシック" pitchFamily="34" charset="-128"/>
                 <a:cs typeface="+mn-cs"/>
@@ -692,7 +838,7 @@
               <a:pPr algn="r" eaLnBrk="0" hangingPunct="0">
                 <a:defRPr/>
               </a:pPr>
-              <a:t>3</a:t>
+              <a:t>2</a:t>
             </a:fld>
             <a:endParaRPr lang="en-US" sz="1200" dirty="0">
               <a:ea typeface="ＭＳ Ｐゴシック" pitchFamily="34" charset="-128"/>
@@ -703,7 +849,7 @@
       </p:sp>
       <p:sp>
         <p:nvSpPr>
-          <p:cNvPr id="103426" name="Rectangle 2"/>
+          <p:cNvPr id="101378" name="Rectangle 2"/>
           <p:cNvSpPr>
             <a:spLocks noGrp="1" noRot="1" noChangeAspect="1" noChangeArrowheads="1" noTextEdit="1"/>
           </p:cNvSpPr>
@@ -717,7 +863,7 @@
       </p:sp>
       <p:sp>
         <p:nvSpPr>
-          <p:cNvPr id="103427" name="Rectangle 3"/>
+          <p:cNvPr id="101379" name="Rectangle 3"/>
           <p:cNvSpPr>
             <a:spLocks noGrp="1" noChangeArrowheads="1"/>
           </p:cNvSpPr>
@@ -734,9 +880,36 @@
           <a:lstStyle/>
           <a:p>
             <a:pPr eaLnBrk="1" hangingPunct="1"/>
+            <a:r>
+              <a:rPr lang="en-US" dirty="0" smtClean="0">
+                <a:ea typeface="ＭＳ Ｐゴシック"/>
+              </a:rPr>
+              <a:t>Started at 1:43 </a:t>
+            </a:r>
+          </a:p>
+          <a:p>
+            <a:pPr eaLnBrk="1" hangingPunct="1"/>
+            <a:r>
+              <a:rPr lang="en-US" dirty="0" smtClean="0">
+                <a:ea typeface="ＭＳ Ｐゴシック"/>
+              </a:rPr>
+              <a:t>10 minutes for this exercise</a:t>
+            </a:r>
+          </a:p>
+          <a:p>
+            <a:pPr eaLnBrk="1" hangingPunct="1"/>
             <a:endParaRPr lang="en-US" dirty="0" smtClean="0">
               <a:ea typeface="ＭＳ Ｐゴシック"/>
             </a:endParaRPr>
+          </a:p>
+          <a:p>
+            <a:pPr eaLnBrk="1" hangingPunct="1"/>
+            <a:r>
+              <a:rPr lang="en-US" dirty="0" smtClean="0">
+                <a:ea typeface="ＭＳ Ｐゴシック"/>
+              </a:rPr>
+              <a:t>1:50 it started</a:t>
+            </a:r>
           </a:p>
         </p:txBody>
       </p:sp>
@@ -767,7 +940,7 @@
       </p:grpSpPr>
       <p:sp>
         <p:nvSpPr>
-          <p:cNvPr id="306177" name="Rectangle 7"/>
+          <p:cNvPr id="285697" name="Rectangle 7"/>
           <p:cNvSpPr txBox="1">
             <a:spLocks noGrp="1" noChangeArrowheads="1"/>
           </p:cNvSpPr>
@@ -795,7 +968,7 @@
             <a:pPr algn="r" eaLnBrk="0" hangingPunct="0">
               <a:defRPr/>
             </a:pPr>
-            <a:fld id="{519DC8B7-FF27-4D91-9FB8-57680F7765E0}" type="slidenum">
+            <a:fld id="{41521DE7-EAC0-4C1C-86CF-F63E9F89FC7D}" type="slidenum">
               <a:rPr lang="en-US" sz="1200">
                 <a:ea typeface="ＭＳ Ｐゴシック" pitchFamily="34" charset="-128"/>
                 <a:cs typeface="+mn-cs"/>
@@ -803,7 +976,7 @@
               <a:pPr algn="r" eaLnBrk="0" hangingPunct="0">
                 <a:defRPr/>
               </a:pPr>
-              <a:t>5</a:t>
+              <a:t>3</a:t>
             </a:fld>
             <a:endParaRPr lang="en-US" sz="1200" dirty="0">
               <a:ea typeface="ＭＳ Ｐゴシック" pitchFamily="34" charset="-128"/>
@@ -814,7 +987,7 @@
       </p:sp>
       <p:sp>
         <p:nvSpPr>
-          <p:cNvPr id="105474" name="Rectangle 2"/>
+          <p:cNvPr id="103426" name="Rectangle 2"/>
           <p:cNvSpPr>
             <a:spLocks noGrp="1" noRot="1" noChangeAspect="1" noChangeArrowheads="1" noTextEdit="1"/>
           </p:cNvSpPr>
@@ -828,7 +1001,7 @@
       </p:sp>
       <p:sp>
         <p:nvSpPr>
-          <p:cNvPr id="105475" name="Rectangle 3"/>
+          <p:cNvPr id="103427" name="Rectangle 3"/>
           <p:cNvSpPr>
             <a:spLocks noGrp="1" noChangeArrowheads="1"/>
           </p:cNvSpPr>
@@ -845,36 +1018,9 @@
           <a:lstStyle/>
           <a:p>
             <a:pPr eaLnBrk="1" hangingPunct="1"/>
-            <a:r>
-              <a:rPr lang="en-US" dirty="0" smtClean="0">
-                <a:ea typeface="ＭＳ Ｐゴシック"/>
-              </a:rPr>
-              <a:t>Started at 1:43 </a:t>
-            </a:r>
-          </a:p>
-          <a:p>
-            <a:pPr eaLnBrk="1" hangingPunct="1"/>
-            <a:r>
-              <a:rPr lang="en-US" dirty="0" smtClean="0">
-                <a:ea typeface="ＭＳ Ｐゴシック"/>
-              </a:rPr>
-              <a:t>10 minutes for this exercise</a:t>
-            </a:r>
-          </a:p>
-          <a:p>
-            <a:pPr eaLnBrk="1" hangingPunct="1"/>
             <a:endParaRPr lang="en-US" dirty="0" smtClean="0">
               <a:ea typeface="ＭＳ Ｐゴシック"/>
             </a:endParaRPr>
-          </a:p>
-          <a:p>
-            <a:pPr eaLnBrk="1" hangingPunct="1"/>
-            <a:r>
-              <a:rPr lang="en-US" dirty="0" smtClean="0">
-                <a:ea typeface="ＭＳ Ｐゴシック"/>
-              </a:rPr>
-              <a:t>1:50 it started</a:t>
-            </a:r>
           </a:p>
         </p:txBody>
       </p:sp>
@@ -930,6 +1076,229 @@
           <a:bodyPr/>
           <a:lstStyle/>
           <a:p>
+            <a:endParaRPr lang="en-US"/>
+          </a:p>
+        </p:txBody>
+      </p:sp>
+      <p:sp>
+        <p:nvSpPr>
+          <p:cNvPr id="4" name="Slide Number Placeholder 3"/>
+          <p:cNvSpPr>
+            <a:spLocks noGrp="1"/>
+          </p:cNvSpPr>
+          <p:nvPr>
+            <p:ph type="sldNum" sz="quarter" idx="10"/>
+          </p:nvPr>
+        </p:nvSpPr>
+        <p:spPr/>
+        <p:txBody>
+          <a:bodyPr/>
+          <a:lstStyle/>
+          <a:p>
+            <a:fld id="{3560C2FB-C494-1A46-A471-884A4E75440F}" type="slidenum">
+              <a:rPr lang="en-US" smtClean="0"/>
+              <a:pPr/>
+              <a:t>4</a:t>
+            </a:fld>
+            <a:endParaRPr lang="en-US" dirty="0"/>
+          </a:p>
+        </p:txBody>
+      </p:sp>
+    </p:spTree>
+    <p:extLst>
+      <p:ext uri="{BB962C8B-B14F-4D97-AF65-F5344CB8AC3E}">
+        <p14:creationId xmlns:p14="http://schemas.microsoft.com/office/powerpoint/2010/main" val="1344061797"/>
+      </p:ext>
+    </p:extLst>
+  </p:cSld>
+  <p:clrMapOvr>
+    <a:masterClrMapping/>
+  </p:clrMapOvr>
+</p:notes>
+</file>
+
+<file path=ppt/notesSlides/notesSlide5.xml><?xml version="1.0" encoding="utf-8"?>
+<p:notes xmlns:a="http://schemas.openxmlformats.org/drawingml/2006/main" xmlns:r="http://schemas.openxmlformats.org/officeDocument/2006/relationships" xmlns:p="http://schemas.openxmlformats.org/presentationml/2006/main">
+  <p:cSld>
+    <p:spTree>
+      <p:nvGrpSpPr>
+        <p:cNvPr id="1" name=""/>
+        <p:cNvGrpSpPr/>
+        <p:nvPr/>
+      </p:nvGrpSpPr>
+      <p:grpSpPr>
+        <a:xfrm>
+          <a:off x="0" y="0"/>
+          <a:ext cx="0" cy="0"/>
+          <a:chOff x="0" y="0"/>
+          <a:chExt cx="0" cy="0"/>
+        </a:xfrm>
+      </p:grpSpPr>
+      <p:sp>
+        <p:nvSpPr>
+          <p:cNvPr id="306177" name="Rectangle 7"/>
+          <p:cNvSpPr txBox="1">
+            <a:spLocks noGrp="1" noChangeArrowheads="1"/>
+          </p:cNvSpPr>
+          <p:nvPr/>
+        </p:nvSpPr>
+        <p:spPr bwMode="auto">
+          <a:xfrm>
+            <a:off x="3886200" y="8686489"/>
+            <a:ext cx="2971800" cy="457512"/>
+          </a:xfrm>
+          <a:prstGeom prst="rect">
+            <a:avLst/>
+          </a:prstGeom>
+          <a:noFill/>
+          <a:ln>
+            <a:miter lim="800000"/>
+            <a:headEnd/>
+            <a:tailEnd/>
+          </a:ln>
+        </p:spPr>
+        <p:txBody>
+          <a:bodyPr anchor="b"/>
+          <a:lstStyle/>
+          <a:p>
+            <a:pPr algn="r" eaLnBrk="0" hangingPunct="0">
+              <a:defRPr/>
+            </a:pPr>
+            <a:fld id="{519DC8B7-FF27-4D91-9FB8-57680F7765E0}" type="slidenum">
+              <a:rPr lang="en-US" sz="1200">
+                <a:ea typeface="ＭＳ Ｐゴシック" pitchFamily="34" charset="-128"/>
+                <a:cs typeface="+mn-cs"/>
+              </a:rPr>
+              <a:pPr algn="r" eaLnBrk="0" hangingPunct="0">
+                <a:defRPr/>
+              </a:pPr>
+              <a:t>5</a:t>
+            </a:fld>
+            <a:endParaRPr lang="en-US" sz="1200" dirty="0">
+              <a:ea typeface="ＭＳ Ｐゴシック" pitchFamily="34" charset="-128"/>
+              <a:cs typeface="+mn-cs"/>
+            </a:endParaRPr>
+          </a:p>
+        </p:txBody>
+      </p:sp>
+      <p:sp>
+        <p:nvSpPr>
+          <p:cNvPr id="105474" name="Rectangle 2"/>
+          <p:cNvSpPr>
+            <a:spLocks noGrp="1" noRot="1" noChangeAspect="1" noChangeArrowheads="1" noTextEdit="1"/>
+          </p:cNvSpPr>
+          <p:nvPr>
+            <p:ph type="sldImg"/>
+          </p:nvPr>
+        </p:nvSpPr>
+        <p:spPr>
+          <a:ln/>
+        </p:spPr>
+      </p:sp>
+      <p:sp>
+        <p:nvSpPr>
+          <p:cNvPr id="105475" name="Rectangle 3"/>
+          <p:cNvSpPr>
+            <a:spLocks noGrp="1" noChangeArrowheads="1"/>
+          </p:cNvSpPr>
+          <p:nvPr>
+            <p:ph type="body" idx="1"/>
+          </p:nvPr>
+        </p:nvSpPr>
+        <p:spPr>
+          <a:noFill/>
+          <a:ln/>
+        </p:spPr>
+        <p:txBody>
+          <a:bodyPr/>
+          <a:lstStyle/>
+          <a:p>
+            <a:pPr eaLnBrk="1" hangingPunct="1"/>
+            <a:r>
+              <a:rPr lang="en-US" dirty="0" smtClean="0">
+                <a:ea typeface="ＭＳ Ｐゴシック"/>
+              </a:rPr>
+              <a:t>Started at 1:43 </a:t>
+            </a:r>
+          </a:p>
+          <a:p>
+            <a:pPr eaLnBrk="1" hangingPunct="1"/>
+            <a:r>
+              <a:rPr lang="en-US" dirty="0" smtClean="0">
+                <a:ea typeface="ＭＳ Ｐゴシック"/>
+              </a:rPr>
+              <a:t>10 minutes for this exercise</a:t>
+            </a:r>
+          </a:p>
+          <a:p>
+            <a:pPr eaLnBrk="1" hangingPunct="1"/>
+            <a:endParaRPr lang="en-US" dirty="0" smtClean="0">
+              <a:ea typeface="ＭＳ Ｐゴシック"/>
+            </a:endParaRPr>
+          </a:p>
+          <a:p>
+            <a:pPr eaLnBrk="1" hangingPunct="1"/>
+            <a:r>
+              <a:rPr lang="en-US" dirty="0" smtClean="0">
+                <a:ea typeface="ＭＳ Ｐゴシック"/>
+              </a:rPr>
+              <a:t>1:50 it started</a:t>
+            </a:r>
+          </a:p>
+        </p:txBody>
+      </p:sp>
+    </p:spTree>
+  </p:cSld>
+  <p:clrMapOvr>
+    <a:masterClrMapping/>
+  </p:clrMapOvr>
+</p:notes>
+</file>
+
+<file path=ppt/notesSlides/notesSlide6.xml><?xml version="1.0" encoding="utf-8"?>
+<p:notes xmlns:a="http://schemas.openxmlformats.org/drawingml/2006/main" xmlns:r="http://schemas.openxmlformats.org/officeDocument/2006/relationships" xmlns:p="http://schemas.openxmlformats.org/presentationml/2006/main">
+  <p:cSld>
+    <p:spTree>
+      <p:nvGrpSpPr>
+        <p:cNvPr id="1" name=""/>
+        <p:cNvGrpSpPr/>
+        <p:nvPr/>
+      </p:nvGrpSpPr>
+      <p:grpSpPr>
+        <a:xfrm>
+          <a:off x="0" y="0"/>
+          <a:ext cx="0" cy="0"/>
+          <a:chOff x="0" y="0"/>
+          <a:chExt cx="0" cy="0"/>
+        </a:xfrm>
+      </p:grpSpPr>
+      <p:sp>
+        <p:nvSpPr>
+          <p:cNvPr id="2" name="Slide Image Placeholder 1"/>
+          <p:cNvSpPr>
+            <a:spLocks noGrp="1" noRot="1" noChangeAspect="1"/>
+          </p:cNvSpPr>
+          <p:nvPr>
+            <p:ph type="sldImg"/>
+          </p:nvPr>
+        </p:nvSpPr>
+        <p:spPr/>
+      </p:sp>
+      <p:sp>
+        <p:nvSpPr>
+          <p:cNvPr id="3" name="Notes Placeholder 2"/>
+          <p:cNvSpPr>
+            <a:spLocks noGrp="1"/>
+          </p:cNvSpPr>
+          <p:nvPr>
+            <p:ph type="body" idx="1"/>
+          </p:nvPr>
+        </p:nvSpPr>
+        <p:spPr/>
+        <p:txBody>
+          <a:bodyPr/>
+          <a:lstStyle/>
+          <a:p>
             <a:endParaRPr lang="en-US" dirty="0"/>
           </a:p>
         </p:txBody>
@@ -962,6 +1331,261 @@
     <p:extLst>
       <p:ext uri="{BB962C8B-B14F-4D97-AF65-F5344CB8AC3E}">
         <p14:creationId xmlns:p14="http://schemas.microsoft.com/office/powerpoint/2010/main" val="1106436955"/>
+      </p:ext>
+    </p:extLst>
+  </p:cSld>
+  <p:clrMapOvr>
+    <a:masterClrMapping/>
+  </p:clrMapOvr>
+</p:notes>
+</file>
+
+<file path=ppt/notesSlides/notesSlide7.xml><?xml version="1.0" encoding="utf-8"?>
+<p:notes xmlns:a="http://schemas.openxmlformats.org/drawingml/2006/main" xmlns:r="http://schemas.openxmlformats.org/officeDocument/2006/relationships" xmlns:p="http://schemas.openxmlformats.org/presentationml/2006/main">
+  <p:cSld>
+    <p:spTree>
+      <p:nvGrpSpPr>
+        <p:cNvPr id="1" name=""/>
+        <p:cNvGrpSpPr/>
+        <p:nvPr/>
+      </p:nvGrpSpPr>
+      <p:grpSpPr>
+        <a:xfrm>
+          <a:off x="0" y="0"/>
+          <a:ext cx="0" cy="0"/>
+          <a:chOff x="0" y="0"/>
+          <a:chExt cx="0" cy="0"/>
+        </a:xfrm>
+      </p:grpSpPr>
+      <p:sp>
+        <p:nvSpPr>
+          <p:cNvPr id="2" name="Slide Image Placeholder 1"/>
+          <p:cNvSpPr>
+            <a:spLocks noGrp="1" noRot="1" noChangeAspect="1"/>
+          </p:cNvSpPr>
+          <p:nvPr>
+            <p:ph type="sldImg"/>
+          </p:nvPr>
+        </p:nvSpPr>
+        <p:spPr/>
+      </p:sp>
+      <p:sp>
+        <p:nvSpPr>
+          <p:cNvPr id="3" name="Notes Placeholder 2"/>
+          <p:cNvSpPr>
+            <a:spLocks noGrp="1"/>
+          </p:cNvSpPr>
+          <p:nvPr>
+            <p:ph type="body" idx="1"/>
+          </p:nvPr>
+        </p:nvSpPr>
+        <p:spPr/>
+        <p:txBody>
+          <a:bodyPr/>
+          <a:lstStyle/>
+          <a:p>
+            <a:endParaRPr lang="en-US"/>
+          </a:p>
+        </p:txBody>
+      </p:sp>
+      <p:sp>
+        <p:nvSpPr>
+          <p:cNvPr id="4" name="Slide Number Placeholder 3"/>
+          <p:cNvSpPr>
+            <a:spLocks noGrp="1"/>
+          </p:cNvSpPr>
+          <p:nvPr>
+            <p:ph type="sldNum" sz="quarter" idx="10"/>
+          </p:nvPr>
+        </p:nvSpPr>
+        <p:spPr/>
+        <p:txBody>
+          <a:bodyPr/>
+          <a:lstStyle/>
+          <a:p>
+            <a:fld id="{3560C2FB-C494-1A46-A471-884A4E75440F}" type="slidenum">
+              <a:rPr lang="en-US" smtClean="0"/>
+              <a:pPr/>
+              <a:t>7</a:t>
+            </a:fld>
+            <a:endParaRPr lang="en-US" dirty="0"/>
+          </a:p>
+        </p:txBody>
+      </p:sp>
+    </p:spTree>
+    <p:extLst>
+      <p:ext uri="{BB962C8B-B14F-4D97-AF65-F5344CB8AC3E}">
+        <p14:creationId xmlns:p14="http://schemas.microsoft.com/office/powerpoint/2010/main" val="1834714535"/>
+      </p:ext>
+    </p:extLst>
+  </p:cSld>
+  <p:clrMapOvr>
+    <a:masterClrMapping/>
+  </p:clrMapOvr>
+</p:notes>
+</file>
+
+<file path=ppt/notesSlides/notesSlide8.xml><?xml version="1.0" encoding="utf-8"?>
+<p:notes xmlns:a="http://schemas.openxmlformats.org/drawingml/2006/main" xmlns:r="http://schemas.openxmlformats.org/officeDocument/2006/relationships" xmlns:p="http://schemas.openxmlformats.org/presentationml/2006/main">
+  <p:cSld>
+    <p:spTree>
+      <p:nvGrpSpPr>
+        <p:cNvPr id="1" name=""/>
+        <p:cNvGrpSpPr/>
+        <p:nvPr/>
+      </p:nvGrpSpPr>
+      <p:grpSpPr>
+        <a:xfrm>
+          <a:off x="0" y="0"/>
+          <a:ext cx="0" cy="0"/>
+          <a:chOff x="0" y="0"/>
+          <a:chExt cx="0" cy="0"/>
+        </a:xfrm>
+      </p:grpSpPr>
+      <p:sp>
+        <p:nvSpPr>
+          <p:cNvPr id="2" name="Slide Image Placeholder 1"/>
+          <p:cNvSpPr>
+            <a:spLocks noGrp="1" noRot="1" noChangeAspect="1"/>
+          </p:cNvSpPr>
+          <p:nvPr>
+            <p:ph type="sldImg"/>
+          </p:nvPr>
+        </p:nvSpPr>
+        <p:spPr/>
+      </p:sp>
+      <p:sp>
+        <p:nvSpPr>
+          <p:cNvPr id="3" name="Notes Placeholder 2"/>
+          <p:cNvSpPr>
+            <a:spLocks noGrp="1"/>
+          </p:cNvSpPr>
+          <p:nvPr>
+            <p:ph type="body" idx="1"/>
+          </p:nvPr>
+        </p:nvSpPr>
+        <p:spPr/>
+        <p:txBody>
+          <a:bodyPr/>
+          <a:lstStyle/>
+          <a:p>
+            <a:endParaRPr lang="en-US"/>
+          </a:p>
+        </p:txBody>
+      </p:sp>
+      <p:sp>
+        <p:nvSpPr>
+          <p:cNvPr id="4" name="Slide Number Placeholder 3"/>
+          <p:cNvSpPr>
+            <a:spLocks noGrp="1"/>
+          </p:cNvSpPr>
+          <p:nvPr>
+            <p:ph type="sldNum" sz="quarter" idx="10"/>
+          </p:nvPr>
+        </p:nvSpPr>
+        <p:spPr/>
+        <p:txBody>
+          <a:bodyPr/>
+          <a:lstStyle/>
+          <a:p>
+            <a:fld id="{3560C2FB-C494-1A46-A471-884A4E75440F}" type="slidenum">
+              <a:rPr lang="en-US" smtClean="0"/>
+              <a:pPr/>
+              <a:t>8</a:t>
+            </a:fld>
+            <a:endParaRPr lang="en-US" dirty="0"/>
+          </a:p>
+        </p:txBody>
+      </p:sp>
+    </p:spTree>
+    <p:extLst>
+      <p:ext uri="{BB962C8B-B14F-4D97-AF65-F5344CB8AC3E}">
+        <p14:creationId xmlns:p14="http://schemas.microsoft.com/office/powerpoint/2010/main" val="3974095600"/>
+      </p:ext>
+    </p:extLst>
+  </p:cSld>
+  <p:clrMapOvr>
+    <a:masterClrMapping/>
+  </p:clrMapOvr>
+</p:notes>
+</file>
+
+<file path=ppt/notesSlides/notesSlide9.xml><?xml version="1.0" encoding="utf-8"?>
+<p:notes xmlns:a="http://schemas.openxmlformats.org/drawingml/2006/main" xmlns:r="http://schemas.openxmlformats.org/officeDocument/2006/relationships" xmlns:p="http://schemas.openxmlformats.org/presentationml/2006/main">
+  <p:cSld>
+    <p:spTree>
+      <p:nvGrpSpPr>
+        <p:cNvPr id="1" name=""/>
+        <p:cNvGrpSpPr/>
+        <p:nvPr/>
+      </p:nvGrpSpPr>
+      <p:grpSpPr>
+        <a:xfrm>
+          <a:off x="0" y="0"/>
+          <a:ext cx="0" cy="0"/>
+          <a:chOff x="0" y="0"/>
+          <a:chExt cx="0" cy="0"/>
+        </a:xfrm>
+      </p:grpSpPr>
+      <p:sp>
+        <p:nvSpPr>
+          <p:cNvPr id="2" name="Slide Image Placeholder 1"/>
+          <p:cNvSpPr>
+            <a:spLocks noGrp="1" noRot="1" noChangeAspect="1"/>
+          </p:cNvSpPr>
+          <p:nvPr>
+            <p:ph type="sldImg"/>
+          </p:nvPr>
+        </p:nvSpPr>
+        <p:spPr/>
+      </p:sp>
+      <p:sp>
+        <p:nvSpPr>
+          <p:cNvPr id="3" name="Notes Placeholder 2"/>
+          <p:cNvSpPr>
+            <a:spLocks noGrp="1"/>
+          </p:cNvSpPr>
+          <p:nvPr>
+            <p:ph type="body" idx="1"/>
+          </p:nvPr>
+        </p:nvSpPr>
+        <p:spPr/>
+        <p:txBody>
+          <a:bodyPr/>
+          <a:lstStyle/>
+          <a:p>
+            <a:endParaRPr lang="en-US"/>
+          </a:p>
+        </p:txBody>
+      </p:sp>
+      <p:sp>
+        <p:nvSpPr>
+          <p:cNvPr id="4" name="Slide Number Placeholder 3"/>
+          <p:cNvSpPr>
+            <a:spLocks noGrp="1"/>
+          </p:cNvSpPr>
+          <p:nvPr>
+            <p:ph type="sldNum" sz="quarter" idx="10"/>
+          </p:nvPr>
+        </p:nvSpPr>
+        <p:spPr/>
+        <p:txBody>
+          <a:bodyPr/>
+          <a:lstStyle/>
+          <a:p>
+            <a:fld id="{3560C2FB-C494-1A46-A471-884A4E75440F}" type="slidenum">
+              <a:rPr lang="en-US" smtClean="0"/>
+              <a:pPr/>
+              <a:t>9</a:t>
+            </a:fld>
+            <a:endParaRPr lang="en-US" dirty="0"/>
+          </a:p>
+        </p:txBody>
+      </p:sp>
+    </p:spTree>
+    <p:extLst>
+      <p:ext uri="{BB962C8B-B14F-4D97-AF65-F5344CB8AC3E}">
+        <p14:creationId xmlns:p14="http://schemas.microsoft.com/office/powerpoint/2010/main" val="3862371205"/>
       </p:ext>
     </p:extLst>
   </p:cSld>
@@ -5289,6 +5913,246 @@
 </p:sld>
 </file>
 
+<file path=ppt/slides/slide10.xml><?xml version="1.0" encoding="utf-8"?>
+<p:sld xmlns:a="http://schemas.openxmlformats.org/drawingml/2006/main" xmlns:r="http://schemas.openxmlformats.org/officeDocument/2006/relationships" xmlns:p="http://schemas.openxmlformats.org/presentationml/2006/main">
+  <p:cSld>
+    <p:spTree>
+      <p:nvGrpSpPr>
+        <p:cNvPr id="1" name=""/>
+        <p:cNvGrpSpPr/>
+        <p:nvPr/>
+      </p:nvGrpSpPr>
+      <p:grpSpPr>
+        <a:xfrm>
+          <a:off x="0" y="0"/>
+          <a:ext cx="0" cy="0"/>
+          <a:chOff x="0" y="0"/>
+          <a:chExt cx="0" cy="0"/>
+        </a:xfrm>
+      </p:grpSpPr>
+      <p:sp>
+        <p:nvSpPr>
+          <p:cNvPr id="303106" name="Slide Number Placeholder 3"/>
+          <p:cNvSpPr txBox="1">
+            <a:spLocks noGrp="1"/>
+          </p:cNvSpPr>
+          <p:nvPr/>
+        </p:nvSpPr>
+        <p:spPr bwMode="auto">
+          <a:xfrm>
+            <a:off x="315868" y="9189943"/>
+            <a:ext cx="866378" cy="541514"/>
+          </a:xfrm>
+          <a:prstGeom prst="rect">
+            <a:avLst/>
+          </a:prstGeom>
+          <a:noFill/>
+          <a:ln>
+            <a:miter lim="800000"/>
+            <a:headEnd/>
+            <a:tailEnd/>
+          </a:ln>
+        </p:spPr>
+        <p:txBody>
+          <a:bodyPr lIns="154707" tIns="77354" rIns="154707" bIns="77354"/>
+          <a:lstStyle/>
+          <a:p>
+            <a:pPr eaLnBrk="0" hangingPunct="0">
+              <a:defRPr/>
+            </a:pPr>
+            <a:fld id="{1BD3BB7B-F997-4B7C-BCBE-A063D59C732E}" type="slidenum">
+              <a:rPr lang="en-US" sz="1500" b="1">
+                <a:solidFill>
+                  <a:srgbClr val="7B7B7B"/>
+                </a:solidFill>
+                <a:ea typeface="ＭＳ Ｐゴシック" pitchFamily="34" charset="-128"/>
+                <a:cs typeface="+mn-cs"/>
+              </a:rPr>
+              <a:pPr eaLnBrk="0" hangingPunct="0">
+                <a:defRPr/>
+              </a:pPr>
+              <a:t>10</a:t>
+            </a:fld>
+            <a:endParaRPr lang="en-US" sz="1500" b="1" dirty="0">
+              <a:solidFill>
+                <a:srgbClr val="7B7B7B"/>
+              </a:solidFill>
+              <a:ea typeface="ＭＳ Ｐゴシック" pitchFamily="34" charset="-128"/>
+              <a:cs typeface="+mn-cs"/>
+            </a:endParaRPr>
+          </a:p>
+        </p:txBody>
+      </p:sp>
+      <p:sp>
+        <p:nvSpPr>
+          <p:cNvPr id="5" name="Text Placeholder 4"/>
+          <p:cNvSpPr>
+            <a:spLocks noGrp="1"/>
+          </p:cNvSpPr>
+          <p:nvPr>
+            <p:ph type="body" sz="quarter" idx="10"/>
+          </p:nvPr>
+        </p:nvSpPr>
+        <p:spPr/>
+        <p:txBody>
+          <a:bodyPr/>
+          <a:lstStyle/>
+          <a:p>
+            <a:r>
+              <a:rPr lang="en-US" dirty="0" smtClean="0"/>
+              <a:t>Demo 4: Displaying </a:t>
+            </a:r>
+            <a:r>
+              <a:rPr lang="en-US" dirty="0" smtClean="0"/>
+              <a:t>Tags, Custom Fields and Duration</a:t>
+            </a:r>
+            <a:endParaRPr lang="en-US" dirty="0" smtClean="0"/>
+          </a:p>
+        </p:txBody>
+      </p:sp>
+    </p:spTree>
+    <p:extLst>
+      <p:ext uri="{BB962C8B-B14F-4D97-AF65-F5344CB8AC3E}">
+        <p14:creationId xmlns:p14="http://schemas.microsoft.com/office/powerpoint/2010/main" val="2871492575"/>
+      </p:ext>
+    </p:extLst>
+  </p:cSld>
+  <p:clrMapOvr>
+    <a:masterClrMapping/>
+  </p:clrMapOvr>
+  <p:transition xmlns:p14="http://schemas.microsoft.com/office/powerpoint/2010/main"/>
+  <p:timing>
+    <p:tnLst>
+      <p:par>
+        <p:cTn xmlns:p14="http://schemas.microsoft.com/office/powerpoint/2010/main" id="1" dur="indefinite" restart="never" nodeType="tmRoot"/>
+      </p:par>
+    </p:tnLst>
+  </p:timing>
+</p:sld>
+</file>
+
+<file path=ppt/slides/slide11.xml><?xml version="1.0" encoding="utf-8"?>
+<p:sld xmlns:a="http://schemas.openxmlformats.org/drawingml/2006/main" xmlns:r="http://schemas.openxmlformats.org/officeDocument/2006/relationships" xmlns:p="http://schemas.openxmlformats.org/presentationml/2006/main">
+  <p:cSld>
+    <p:spTree>
+      <p:nvGrpSpPr>
+        <p:cNvPr id="1" name=""/>
+        <p:cNvGrpSpPr/>
+        <p:nvPr/>
+      </p:nvGrpSpPr>
+      <p:grpSpPr>
+        <a:xfrm>
+          <a:off x="0" y="0"/>
+          <a:ext cx="0" cy="0"/>
+          <a:chOff x="0" y="0"/>
+          <a:chExt cx="0" cy="0"/>
+        </a:xfrm>
+      </p:grpSpPr>
+      <p:sp>
+        <p:nvSpPr>
+          <p:cNvPr id="3" name="Text Placeholder 2"/>
+          <p:cNvSpPr>
+            <a:spLocks noGrp="1"/>
+          </p:cNvSpPr>
+          <p:nvPr>
+            <p:ph type="body" sz="quarter" idx="11"/>
+          </p:nvPr>
+        </p:nvSpPr>
+        <p:spPr/>
+        <p:txBody>
+          <a:bodyPr/>
+          <a:lstStyle/>
+          <a:p>
+            <a:r>
+              <a:rPr lang="en-US" sz="4700" dirty="0"/>
+              <a:t>Thank you</a:t>
+            </a:r>
+          </a:p>
+        </p:txBody>
+      </p:sp>
+      <p:sp>
+        <p:nvSpPr>
+          <p:cNvPr id="5" name="Text Placeholder 4"/>
+          <p:cNvSpPr>
+            <a:spLocks noGrp="1"/>
+          </p:cNvSpPr>
+          <p:nvPr>
+            <p:ph type="body" sz="quarter" idx="12"/>
+          </p:nvPr>
+        </p:nvSpPr>
+        <p:spPr/>
+        <p:txBody>
+          <a:bodyPr/>
+          <a:lstStyle/>
+          <a:p>
+            <a:r>
+              <a:rPr lang="en-US" dirty="0" smtClean="0"/>
+              <a:t>Brightcove Learning</a:t>
+            </a:r>
+            <a:endParaRPr lang="en-US" dirty="0"/>
+          </a:p>
+        </p:txBody>
+      </p:sp>
+      <p:sp>
+        <p:nvSpPr>
+          <p:cNvPr id="4" name="Slide Number Placeholder 3"/>
+          <p:cNvSpPr>
+            <a:spLocks noGrp="1"/>
+          </p:cNvSpPr>
+          <p:nvPr>
+            <p:ph type="sldNum" sz="quarter" idx="4294967295"/>
+          </p:nvPr>
+        </p:nvSpPr>
+        <p:spPr>
+          <a:xfrm>
+            <a:off x="1" y="9253119"/>
+            <a:ext cx="812230" cy="403878"/>
+          </a:xfrm>
+          <a:prstGeom prst="rect">
+            <a:avLst/>
+          </a:prstGeom>
+        </p:spPr>
+        <p:txBody>
+          <a:bodyPr/>
+          <a:lstStyle/>
+          <a:p>
+            <a:pPr>
+              <a:defRPr/>
+            </a:pPr>
+            <a:fld id="{E089BD15-BC77-46D6-86B9-64976AF1A8F1}" type="slidenum">
+              <a:rPr lang="en-US" smtClean="0"/>
+              <a:pPr>
+                <a:defRPr/>
+              </a:pPr>
+              <a:t>11</a:t>
+            </a:fld>
+            <a:endParaRPr lang="en-US" dirty="0"/>
+          </a:p>
+        </p:txBody>
+      </p:sp>
+    </p:spTree>
+    <p:extLst>
+      <p:ext uri="{BB962C8B-B14F-4D97-AF65-F5344CB8AC3E}">
+        <p14:creationId xmlns:p14="http://schemas.microsoft.com/office/powerpoint/2010/main" val="3700295984"/>
+      </p:ext>
+    </p:extLst>
+  </p:cSld>
+  <p:clrMapOvr>
+    <a:masterClrMapping/>
+  </p:clrMapOvr>
+  <p:transition xmlns:p14="http://schemas.microsoft.com/office/powerpoint/2010/main" spd="med">
+    <p:fade/>
+  </p:transition>
+  <p:timing>
+    <p:tnLst>
+      <p:par>
+        <p:cTn xmlns:p14="http://schemas.microsoft.com/office/powerpoint/2010/main" id="1" dur="indefinite" restart="never" nodeType="tmRoot"/>
+      </p:par>
+    </p:tnLst>
+  </p:timing>
+</p:sld>
+</file>
+
 <file path=ppt/slides/slide2.xml><?xml version="1.0" encoding="utf-8"?>
 <p:sld xmlns:a="http://schemas.openxmlformats.org/drawingml/2006/main" xmlns:r="http://schemas.openxmlformats.org/officeDocument/2006/relationships" xmlns:p="http://schemas.openxmlformats.org/presentationml/2006/main">
   <p:cSld>
@@ -5470,18 +6334,27 @@
           <a:p>
             <a:pPr lvl="1" eaLnBrk="1" hangingPunct="1"/>
             <a:r>
-              <a:rPr lang="en-US" sz="3500" dirty="0"/>
+              <a:rPr lang="en-US" sz="3500" dirty="0">
+                <a:latin typeface="Source Code Pro"/>
+                <a:cs typeface="Source Code Pro"/>
+              </a:rPr>
               <a:t>addEventListener(type, handler);</a:t>
             </a:r>
           </a:p>
           <a:p>
             <a:pPr lvl="1" eaLnBrk="1" hangingPunct="1"/>
             <a:r>
-              <a:rPr lang="en-US" sz="3500" dirty="0"/>
+              <a:rPr lang="en-US" sz="3500" dirty="0">
+                <a:latin typeface="Source Code Pro"/>
+                <a:cs typeface="Source Code Pro"/>
+              </a:rPr>
               <a:t>removeEventListener(type, handler)</a:t>
             </a:r>
             <a:r>
-              <a:rPr lang="en-US" sz="3500" dirty="0" smtClean="0"/>
+              <a:rPr lang="en-US" sz="3500" dirty="0" smtClean="0">
+                <a:latin typeface="Source Code Pro"/>
+                <a:cs typeface="Source Code Pro"/>
+              </a:rPr>
               <a:t>;</a:t>
             </a:r>
           </a:p>
@@ -5655,6 +6528,16 @@
               <a:defRPr/>
             </a:pPr>
             <a:r>
+              <a:rPr lang="en-US" sz="3200" kern="0" dirty="0" smtClean="0">
+                <a:solidFill>
+                  <a:schemeClr val="tx1"/>
+                </a:solidFill>
+                <a:latin typeface="Source Code Pro"/>
+                <a:cs typeface="Source Code Pro"/>
+              </a:rPr>
+              <a:t>var onTemplateLoad = </a:t>
+            </a:r>
+            <a:r>
               <a:rPr lang="en-US" sz="3200" kern="0" dirty="0">
                 <a:solidFill>
                   <a:schemeClr val="tx1"/>
@@ -5662,7 +6545,7 @@
                 <a:latin typeface="Source Code Pro"/>
                 <a:cs typeface="Source Code Pro"/>
               </a:rPr>
-              <a:t>onTemplateLoad : function (experienceID) {</a:t>
+              <a:t>function (experienceID) {</a:t>
             </a:r>
           </a:p>
           <a:p>
@@ -5715,12 +6598,22 @@
             <a:r>
               <a:rPr lang="en-US" sz="3200" b="1" kern="0" dirty="0" smtClean="0">
                 <a:solidFill>
+                  <a:srgbClr val="FF0000"/>
+                </a:solidFill>
+                <a:latin typeface="Source Code Pro"/>
+                <a:cs typeface="Source Code Pro"/>
+              </a:rPr>
+              <a:t>APIModules</a:t>
+            </a:r>
+            <a:r>
+              <a:rPr lang="en-US" sz="3200" b="1" kern="0" dirty="0" smtClean="0">
+                <a:solidFill>
                   <a:schemeClr val="tx1"/>
                 </a:solidFill>
                 <a:latin typeface="Source Code Pro"/>
                 <a:cs typeface="Source Code Pro"/>
               </a:rPr>
-              <a:t>APIModules </a:t>
+              <a:t> </a:t>
             </a:r>
             <a:r>
               <a:rPr lang="en-US" sz="3200" b="1" kern="0" dirty="0">
@@ -5817,7 +6710,7 @@
                 <a:latin typeface="Source Code Pro"/>
                 <a:cs typeface="Source Code Pro"/>
               </a:rPr>
-              <a:t>onTemplateReady </a:t>
+              <a:t>var onTemplateReady = </a:t>
             </a:r>
             <a:r>
               <a:rPr lang="en-US" sz="3200" kern="0" dirty="0">
@@ -5827,7 +6720,7 @@
                 <a:latin typeface="Source Code Pro"/>
                 <a:cs typeface="Source Code Pro"/>
               </a:rPr>
-              <a:t>: function (evt) {</a:t>
+              <a:t>function (evt) {</a:t>
             </a:r>
           </a:p>
           <a:p>
@@ -5890,12 +6783,22 @@
             <a:r>
               <a:rPr lang="en-US" sz="3200" b="1" kern="0" dirty="0">
                 <a:solidFill>
+                  <a:srgbClr val="FF0000"/>
+                </a:solidFill>
+                <a:latin typeface="Source Code Pro"/>
+                <a:cs typeface="Source Code Pro"/>
+              </a:rPr>
+              <a:t>APIModules</a:t>
+            </a:r>
+            <a:r>
+              <a:rPr lang="en-US" sz="3200" b="1" kern="0" dirty="0">
+                <a:solidFill>
                   <a:schemeClr val="tx1"/>
                 </a:solidFill>
                 <a:latin typeface="Source Code Pro"/>
                 <a:cs typeface="Source Code Pro"/>
               </a:rPr>
-              <a:t>APIModules.VIDEO_PLAYER</a:t>
+              <a:t>.VIDEO_PLAYER</a:t>
             </a:r>
             <a:r>
               <a:rPr lang="en-US" sz="3200" kern="0" dirty="0">
@@ -6302,15 +7205,34 @@
             </a:r>
             <a:r>
               <a:rPr lang="en-US" sz="3200" dirty="0"/>
-              <a:t>in Brightcove Studio media module</a:t>
+              <a:t>in </a:t>
+            </a:r>
+            <a:r>
+              <a:rPr lang="en-US" sz="3200" dirty="0" smtClean="0"/>
+              <a:t>Video Cloud Studio </a:t>
+            </a:r>
+            <a:r>
+              <a:rPr lang="en-US" sz="3200" dirty="0"/>
+              <a:t>media module</a:t>
             </a:r>
           </a:p>
           <a:p>
             <a:pPr lvl="1" eaLnBrk="1" hangingPunct="1"/>
             <a:r>
-              <a:rPr lang="en-US" sz="3200" dirty="0"/>
-              <a:t>MediaDTO =&gt; VideoDTO</a:t>
-            </a:r>
+              <a:rPr lang="en-US" sz="3200" dirty="0" smtClean="0"/>
+              <a:t>mediaDTO </a:t>
+            </a:r>
+            <a:r>
+              <a:rPr lang="en-US" sz="3200" dirty="0" smtClean="0">
+                <a:sym typeface="Wingdings"/>
+              </a:rPr>
+              <a:t></a:t>
+            </a:r>
+            <a:r>
+              <a:rPr lang="en-US" sz="3200" dirty="0" smtClean="0"/>
+              <a:t> videoDTO</a:t>
+            </a:r>
+            <a:endParaRPr lang="en-US" sz="3200" dirty="0"/>
           </a:p>
           <a:p>
             <a:pPr eaLnBrk="1" hangingPunct="1"/>
@@ -6320,7 +7242,26 @@
             </a:r>
             <a:r>
               <a:rPr lang="en-US" sz="3200" dirty="0"/>
-              <a:t>get the VideoDTO for the video currently in the player, get a reference to the VideoPlayer Module, and then use the getCurrentVideo() method</a:t>
+              <a:t>get the </a:t>
+            </a:r>
+            <a:r>
+              <a:rPr lang="en-US" sz="3200" dirty="0" smtClean="0"/>
+              <a:t>videoDTO </a:t>
+            </a:r>
+            <a:r>
+              <a:rPr lang="en-US" sz="3200" dirty="0"/>
+              <a:t>for the video currently in the player, get a reference to the VideoPlayer Module, and then use the </a:t>
+            </a:r>
+            <a:r>
+              <a:rPr lang="en-US" sz="3200" dirty="0">
+                <a:latin typeface="Source Code Pro"/>
+                <a:cs typeface="Source Code Pro"/>
+              </a:rPr>
+              <a:t>getCurrentVideo()</a:t>
+            </a:r>
+            <a:r>
+              <a:rPr lang="en-US" sz="3200" dirty="0"/>
+              <a:t> method</a:t>
             </a:r>
           </a:p>
           <a:p>
@@ -6392,18 +7333,34 @@
           <a:lstStyle/>
           <a:p>
             <a:r>
-              <a:rPr lang="en-US" dirty="0" smtClean="0"/>
+              <a:rPr lang="en-US" dirty="0" smtClean="0">
+                <a:solidFill>
+                  <a:schemeClr val="tx1"/>
+                </a:solidFill>
+              </a:rPr>
               <a:t>Displaying </a:t>
             </a:r>
             <a:r>
-              <a:rPr lang="en-US" cap="none" dirty="0" smtClean="0"/>
+              <a:rPr lang="en-US" cap="none" dirty="0" smtClean="0">
+                <a:solidFill>
+                  <a:schemeClr val="tx1"/>
+                </a:solidFill>
+              </a:rPr>
               <a:t>video</a:t>
             </a:r>
             <a:r>
-              <a:rPr lang="en-US" dirty="0" smtClean="0"/>
+              <a:rPr lang="en-US" dirty="0" smtClean="0">
+                <a:solidFill>
+                  <a:schemeClr val="tx1"/>
+                </a:solidFill>
+              </a:rPr>
               <a:t>DTO information in HTML</a:t>
             </a:r>
-            <a:endParaRPr lang="en-US" dirty="0"/>
+            <a:endParaRPr lang="en-US" dirty="0">
+              <a:solidFill>
+                <a:schemeClr val="tx1"/>
+              </a:solidFill>
+            </a:endParaRPr>
           </a:p>
         </p:txBody>
       </p:sp>
@@ -6446,193 +7403,19 @@
             </a:r>
           </a:p>
           <a:p>
-            <a:pPr marL="485775" lvl="1" indent="0">
-              <a:buNone/>
-            </a:pPr>
-            <a:r>
-              <a:rPr lang="en-US" sz="2200" dirty="0" smtClean="0">
-                <a:latin typeface="Source Code Pro"/>
-                <a:cs typeface="Source Code Pro"/>
-              </a:rPr>
-              <a:t>displayInfo.innerHTML </a:t>
-            </a:r>
-            <a:r>
-              <a:rPr lang="en-US" sz="2200" dirty="0">
-                <a:latin typeface="Source Code Pro"/>
-                <a:cs typeface="Source Code Pro"/>
-              </a:rPr>
-              <a:t>+= "&lt;p&gt;Custom Fields:&lt;/p&gt;&lt;ul&gt;";</a:t>
-            </a:r>
-          </a:p>
-          <a:p>
-            <a:pPr marL="485775" lvl="1" indent="0">
-              <a:buNone/>
-            </a:pPr>
-            <a:r>
-              <a:rPr lang="en-US" sz="2200" dirty="0" smtClean="0">
-                <a:latin typeface="Source Code Pro"/>
-                <a:cs typeface="Source Code Pro"/>
-              </a:rPr>
-              <a:t>for </a:t>
-            </a:r>
-            <a:r>
-              <a:rPr lang="en-US" sz="2200" dirty="0">
-                <a:latin typeface="Source Code Pro"/>
-                <a:cs typeface="Source Code Pro"/>
-              </a:rPr>
-              <a:t>(var key in videoDTO.customFields) {</a:t>
-            </a:r>
-          </a:p>
-          <a:p>
-            <a:pPr marL="485775" lvl="1" indent="0">
-              <a:buNone/>
-            </a:pPr>
-            <a:r>
-              <a:rPr lang="en-US" sz="2200" dirty="0" smtClean="0">
-                <a:latin typeface="Source Code Pro"/>
-                <a:cs typeface="Source Code Pro"/>
-              </a:rPr>
-              <a:t>  displayInfo.innerHTML </a:t>
-            </a:r>
-            <a:r>
-              <a:rPr lang="en-US" sz="2200" dirty="0">
-                <a:latin typeface="Source Code Pro"/>
-                <a:cs typeface="Source Code Pro"/>
-              </a:rPr>
-              <a:t>+= "&lt;li&gt;" + key + ": " + videoDTO.customFields[key] + "&lt;/li&gt;";</a:t>
-            </a:r>
-          </a:p>
-          <a:p>
-            <a:pPr marL="485775" lvl="1" indent="0">
-              <a:buNone/>
-            </a:pPr>
-            <a:r>
-              <a:rPr lang="en-US" sz="2200" dirty="0" smtClean="0">
-                <a:latin typeface="Source Code Pro"/>
-                <a:cs typeface="Source Code Pro"/>
-              </a:rPr>
-              <a:t>}</a:t>
-            </a:r>
-            <a:endParaRPr lang="en-US" sz="2200" dirty="0">
-              <a:latin typeface="Source Code Pro"/>
-              <a:cs typeface="Source Code Pro"/>
-            </a:endParaRPr>
-          </a:p>
-          <a:p>
-            <a:pPr marL="485775" lvl="1" indent="0">
-              <a:buNone/>
-            </a:pPr>
-            <a:r>
-              <a:rPr lang="en-US" sz="2200" dirty="0" smtClean="0">
-                <a:latin typeface="Source Code Pro"/>
-                <a:cs typeface="Source Code Pro"/>
-              </a:rPr>
-              <a:t>displayInfo.innerHTML </a:t>
-            </a:r>
-            <a:r>
-              <a:rPr lang="en-US" sz="2200" dirty="0">
-                <a:latin typeface="Source Code Pro"/>
-                <a:cs typeface="Source Code Pro"/>
-              </a:rPr>
-              <a:t>+= "&lt;/ul&gt;"</a:t>
-            </a:r>
-            <a:r>
-              <a:rPr lang="en-US" sz="2200" dirty="0" smtClean="0">
-                <a:latin typeface="Source Code Pro"/>
-                <a:cs typeface="Source Code Pro"/>
-              </a:rPr>
-              <a:t>;</a:t>
-            </a:r>
-            <a:endParaRPr lang="en-US" sz="2200" dirty="0">
-              <a:latin typeface="Source Code Pro"/>
-              <a:cs typeface="Source Code Pro"/>
-            </a:endParaRPr>
-          </a:p>
-          <a:p>
             <a:pPr lvl="1"/>
             <a:r>
               <a:rPr lang="en-US" sz="3200" dirty="0" smtClean="0"/>
-              <a:t>Build HTML with a templating tool (like Handlebars)</a:t>
-            </a:r>
-          </a:p>
-          <a:p>
-            <a:pPr marL="485775" lvl="1" indent="0">
-              <a:buNone/>
-            </a:pPr>
-            <a:r>
-              <a:rPr lang="en-US" sz="2200" dirty="0" smtClean="0">
-                <a:latin typeface="Source Code Pro"/>
-                <a:cs typeface="Source Code Pro"/>
-              </a:rPr>
-              <a:t>var videoInfoTemplate </a:t>
-            </a:r>
-            <a:r>
-              <a:rPr lang="en-US" sz="2200" dirty="0">
-                <a:latin typeface="Source Code Pro"/>
-                <a:cs typeface="Source Code Pro"/>
-              </a:rPr>
-              <a:t>= "&lt;h3&gt;About this video&lt;/h3&gt;&lt;h4&gt;Title: {{displayName}}&lt;/h4&gt;&lt;p&gt;Description: {{shortDescription}}&lt;/p&gt;&lt;p&gt;Tags:&lt;/p&gt;&lt;ul&gt;{{#tags}}&lt;li&gt;{{.}}&lt;/li&gt;{{/tags}}&lt;/ul&gt;</a:t>
-            </a:r>
-            <a:r>
-              <a:rPr lang="en-US" sz="2200" dirty="0" smtClean="0">
-                <a:latin typeface="Source Code Pro"/>
-                <a:cs typeface="Source Code Pro"/>
-              </a:rPr>
-              <a:t>";</a:t>
-            </a:r>
-            <a:endParaRPr lang="en-US" sz="2200" dirty="0">
-              <a:latin typeface="Source Code Pro"/>
-              <a:cs typeface="Source Code Pro"/>
-            </a:endParaRPr>
-          </a:p>
-          <a:p>
-            <a:pPr marL="485775" lvl="1" indent="0">
-              <a:buNone/>
-            </a:pPr>
-            <a:r>
-              <a:rPr lang="en-US" sz="2200" dirty="0" smtClean="0">
-                <a:latin typeface="Source Code Pro"/>
-                <a:cs typeface="Source Code Pro"/>
-              </a:rPr>
-              <a:t>template </a:t>
-            </a:r>
-            <a:r>
-              <a:rPr lang="en-US" sz="2200" dirty="0">
-                <a:latin typeface="Source Code Pro"/>
-                <a:cs typeface="Source Code Pro"/>
-              </a:rPr>
-              <a:t>= Handlebars.compile(videoInfoTemplate);</a:t>
-            </a:r>
-          </a:p>
-          <a:p>
-            <a:pPr marL="485775" lvl="1" indent="0">
-              <a:buNone/>
-            </a:pPr>
-            <a:r>
-              <a:rPr lang="en-US" sz="2200" dirty="0">
-                <a:latin typeface="Source Code Pro"/>
-                <a:cs typeface="Source Code Pro"/>
-              </a:rPr>
-              <a:t>results = template(videoDTO);</a:t>
-            </a:r>
-          </a:p>
-          <a:p>
-            <a:pPr marL="485775" lvl="1" indent="0">
-              <a:buNone/>
-            </a:pPr>
-            <a:r>
-              <a:rPr lang="en-US" sz="2200" dirty="0">
-                <a:latin typeface="Source Code Pro"/>
-                <a:cs typeface="Source Code Pro"/>
-              </a:rPr>
-              <a:t>displayInfo.innerHTML = results;</a:t>
-            </a:r>
-          </a:p>
-          <a:p>
-            <a:pPr marL="485775" lvl="1" indent="0">
-              <a:buNone/>
-            </a:pPr>
-            <a:endParaRPr lang="en-US" dirty="0"/>
+              <a:t>Build HTML with a </a:t>
+            </a:r>
+            <a:r>
+              <a:rPr lang="en-US" sz="3200" dirty="0" err="1" smtClean="0"/>
+              <a:t>templating</a:t>
+            </a:r>
+            <a:r>
+              <a:rPr lang="en-US" sz="3200" dirty="0" smtClean="0"/>
+              <a:t> engine</a:t>
+            </a:r>
           </a:p>
         </p:txBody>
       </p:sp>
@@ -6679,6 +7462,13 @@
   <p:clrMapOvr>
     <a:masterClrMapping/>
   </p:clrMapOvr>
+  <p:timing>
+    <p:tnLst>
+      <p:par>
+        <p:cTn xmlns:p14="http://schemas.microsoft.com/office/powerpoint/2010/main" id="1" dur="indefinite" restart="never" nodeType="tmRoot"/>
+      </p:par>
+    </p:tnLst>
+  </p:timing>
 </p:sld>
 </file>
 
@@ -6716,7 +7506,7 @@
           <a:p>
             <a:r>
               <a:rPr lang="en-US" dirty="0" smtClean="0"/>
-              <a:t>Getting the Video Duration</a:t>
+              <a:t>Build HTML with JavaScript</a:t>
             </a:r>
             <a:endParaRPr lang="en-US" dirty="0"/>
           </a:p>
@@ -6737,176 +7527,167 @@
           <a:bodyPr/>
           <a:lstStyle/>
           <a:p>
-            <a:r>
-              <a:rPr lang="en-US" sz="3200" dirty="0" smtClean="0"/>
-              <a:t>Another VIDEO_PLAYER module method: </a:t>
-            </a:r>
-            <a:r>
-              <a:rPr lang="en-US" sz="3200" dirty="0" smtClean="0"/>
+            <a:pPr marL="485775" lvl="1" indent="0">
+              <a:buNone/>
+            </a:pPr>
+            <a:r>
+              <a:rPr lang="en-US" sz="3600" dirty="0" err="1">
+                <a:latin typeface="Source Code Pro"/>
+                <a:cs typeface="Source Code Pro"/>
+              </a:rPr>
+              <a:t>displayInfo.innerHTML</a:t>
+            </a:r>
+            <a:r>
+              <a:rPr lang="en-US" sz="3600" dirty="0">
+                <a:latin typeface="Source Code Pro"/>
+                <a:cs typeface="Source Code Pro"/>
+              </a:rPr>
+              <a:t> += "&lt;p&gt;Custom Fields:&lt;/p&gt;&lt;</a:t>
+            </a:r>
+            <a:r>
+              <a:rPr lang="en-US" sz="3600" dirty="0" err="1">
+                <a:latin typeface="Source Code Pro"/>
+                <a:cs typeface="Source Code Pro"/>
+              </a:rPr>
+              <a:t>ul</a:t>
+            </a:r>
+            <a:r>
+              <a:rPr lang="en-US" sz="3600" dirty="0">
+                <a:latin typeface="Source Code Pro"/>
+                <a:cs typeface="Source Code Pro"/>
+              </a:rPr>
+              <a:t>&gt;";</a:t>
+            </a:r>
+          </a:p>
+          <a:p>
+            <a:pPr marL="485775" lvl="1" indent="0">
+              <a:buNone/>
+            </a:pPr>
+            <a:r>
+              <a:rPr lang="en-US" sz="3600" dirty="0">
+                <a:solidFill>
+                  <a:srgbClr val="FF0000"/>
+                </a:solidFill>
+                <a:latin typeface="Source Code Pro"/>
+                <a:cs typeface="Source Code Pro"/>
+              </a:rPr>
+              <a:t>for</a:t>
+            </a:r>
+            <a:r>
+              <a:rPr lang="en-US" sz="3600" dirty="0">
+                <a:latin typeface="Source Code Pro"/>
+                <a:cs typeface="Source Code Pro"/>
+              </a:rPr>
+              <a:t> (var key </a:t>
+            </a:r>
+            <a:r>
+              <a:rPr lang="en-US" sz="3600" dirty="0">
+                <a:solidFill>
+                  <a:srgbClr val="FF0000"/>
+                </a:solidFill>
+                <a:latin typeface="Source Code Pro"/>
+                <a:cs typeface="Source Code Pro"/>
+              </a:rPr>
+              <a:t>in</a:t>
+            </a:r>
+            <a:r>
+              <a:rPr lang="en-US" sz="3600" dirty="0">
+                <a:latin typeface="Source Code Pro"/>
+                <a:cs typeface="Source Code Pro"/>
+              </a:rPr>
+              <a:t> </a:t>
+            </a:r>
+            <a:r>
+              <a:rPr lang="en-US" sz="3600" dirty="0" err="1">
+                <a:latin typeface="Source Code Pro"/>
+                <a:cs typeface="Source Code Pro"/>
+              </a:rPr>
+              <a:t>videoDTO.customFields</a:t>
+            </a:r>
+            <a:r>
+              <a:rPr lang="en-US" sz="3600" dirty="0">
+                <a:latin typeface="Source Code Pro"/>
+                <a:cs typeface="Source Code Pro"/>
+              </a:rPr>
+              <a:t>) {</a:t>
+            </a:r>
+          </a:p>
+          <a:p>
+            <a:pPr marL="485775" lvl="1" indent="0">
+              <a:buNone/>
+            </a:pPr>
+            <a:r>
+              <a:rPr lang="en-US" sz="3600" dirty="0">
+                <a:latin typeface="Source Code Pro"/>
+                <a:cs typeface="Source Code Pro"/>
+              </a:rPr>
+              <a:t>  </a:t>
+            </a:r>
+            <a:r>
+              <a:rPr lang="en-US" sz="3600" dirty="0" err="1">
+                <a:latin typeface="Source Code Pro"/>
+                <a:cs typeface="Source Code Pro"/>
+              </a:rPr>
+              <a:t>displayInfo.innerHTML</a:t>
+            </a:r>
+            <a:r>
+              <a:rPr lang="en-US" sz="3600" dirty="0">
+                <a:latin typeface="Source Code Pro"/>
+                <a:cs typeface="Source Code Pro"/>
+              </a:rPr>
+              <a:t> += "&lt;li&gt;" + key + ": " + </a:t>
+            </a:r>
+            <a:r>
+              <a:rPr lang="en-US" sz="3600" dirty="0" smtClean="0">
+                <a:latin typeface="Source Code Pro"/>
+                <a:cs typeface="Source Code Pro"/>
+              </a:rPr>
               <a:t/>
             </a:r>
             <a:br>
-              <a:rPr lang="en-US" sz="3200" dirty="0" smtClean="0"/>
+              <a:rPr lang="en-US" sz="3600" dirty="0" smtClean="0">
+                <a:latin typeface="Source Code Pro"/>
+                <a:cs typeface="Source Code Pro"/>
+              </a:rPr>
             </a:br>
             <a:r>
-              <a:rPr lang="en-US" sz="3200" dirty="0" smtClean="0"/>
-              <a:t>  </a:t>
-            </a:r>
-            <a:r>
-              <a:rPr lang="en-US" sz="3200" dirty="0" err="1" smtClean="0">
-                <a:latin typeface="Source Code Pro"/>
-                <a:cs typeface="Source Code Pro"/>
-              </a:rPr>
-              <a:t>getVideoDuration</a:t>
-            </a:r>
-            <a:r>
-              <a:rPr lang="en-US" sz="3200" dirty="0" smtClean="0">
-                <a:latin typeface="Source Code Pro"/>
-                <a:cs typeface="Source Code Pro"/>
-              </a:rPr>
-              <a:t>(</a:t>
-            </a:r>
-            <a:r>
-              <a:rPr lang="en-US" sz="3200" dirty="0" smtClean="0">
-                <a:latin typeface="Source Code Pro"/>
-                <a:cs typeface="Source Code Pro"/>
-              </a:rPr>
-              <a:t>formatted, </a:t>
-            </a:r>
-            <a:r>
-              <a:rPr lang="en-US" sz="3200" dirty="0" smtClean="0">
-                <a:latin typeface="Source Code Pro"/>
-                <a:cs typeface="Source Code Pro"/>
-              </a:rPr>
-              <a:t>callback)</a:t>
-            </a:r>
-          </a:p>
-          <a:p>
-            <a:pPr lvl="1"/>
-            <a:r>
-              <a:rPr lang="en-US" sz="3200" dirty="0" smtClean="0"/>
-              <a:t>The video length is in the DTO, but as milliseconds – this method gives you a nicely formatted version</a:t>
-            </a:r>
-          </a:p>
-          <a:p>
-            <a:pPr lvl="1"/>
-            <a:endParaRPr lang="en-US" dirty="0"/>
+              <a:rPr lang="en-US" sz="3600" dirty="0" smtClean="0">
+                <a:latin typeface="Source Code Pro"/>
+                <a:cs typeface="Source Code Pro"/>
+              </a:rPr>
+              <a:t>		</a:t>
+            </a:r>
+            <a:r>
+              <a:rPr lang="en-US" sz="3600" dirty="0" err="1" smtClean="0">
+                <a:latin typeface="Source Code Pro"/>
+                <a:cs typeface="Source Code Pro"/>
+              </a:rPr>
+              <a:t>videoDTO.customFields</a:t>
+            </a:r>
+            <a:r>
+              <a:rPr lang="en-US" sz="3600" dirty="0">
+                <a:latin typeface="Source Code Pro"/>
+                <a:cs typeface="Source Code Pro"/>
+              </a:rPr>
+              <a:t>[key] + "&lt;/li&gt;";</a:t>
+            </a:r>
+          </a:p>
+          <a:p>
+            <a:pPr marL="485775" lvl="1" indent="0">
+              <a:buNone/>
+            </a:pPr>
+            <a:r>
+              <a:rPr lang="en-US" sz="3600" dirty="0">
+                <a:latin typeface="Source Code Pro"/>
+                <a:cs typeface="Source Code Pro"/>
+              </a:rPr>
+              <a:t>}</a:t>
+            </a:r>
           </a:p>
           <a:p>
             <a:pPr marL="0" indent="0">
               <a:buNone/>
             </a:pPr>
-            <a:r>
-              <a:rPr lang="en-US" sz="2800" dirty="0">
-                <a:latin typeface="Source Code Pro"/>
-                <a:cs typeface="Source Code Pro"/>
-              </a:rPr>
-              <a:t>videoPlayer.</a:t>
-            </a:r>
-            <a:r>
-              <a:rPr lang="en-US" sz="2800" b="1" dirty="0">
-                <a:latin typeface="Source Code Pro"/>
-                <a:cs typeface="Source Code Pro"/>
-              </a:rPr>
-              <a:t>getVideoDuration</a:t>
-            </a:r>
-            <a:r>
-              <a:rPr lang="en-US" sz="2800" dirty="0">
-                <a:latin typeface="Source Code Pro"/>
-                <a:cs typeface="Source Code Pro"/>
-              </a:rPr>
-              <a:t>( </a:t>
-            </a:r>
-            <a:r>
-              <a:rPr lang="en-US" sz="2800" b="1" dirty="0">
-                <a:latin typeface="Source Code Pro"/>
-                <a:cs typeface="Source Code Pro"/>
-              </a:rPr>
-              <a:t>true</a:t>
-            </a:r>
-            <a:r>
-              <a:rPr lang="en-US" sz="2800" dirty="0">
-                <a:latin typeface="Source Code Pro"/>
-                <a:cs typeface="Source Code Pro"/>
-              </a:rPr>
-              <a:t>, function(</a:t>
-            </a:r>
-            <a:r>
-              <a:rPr lang="en-US" sz="2800" b="1" dirty="0">
-                <a:latin typeface="Source Code Pro"/>
-                <a:cs typeface="Source Code Pro"/>
-              </a:rPr>
-              <a:t>duration</a:t>
-            </a:r>
-            <a:r>
-              <a:rPr lang="en-US" sz="2800" dirty="0">
-                <a:latin typeface="Source Code Pro"/>
-                <a:cs typeface="Source Code Pro"/>
-              </a:rPr>
-              <a:t>) {</a:t>
-            </a:r>
-          </a:p>
-          <a:p>
-            <a:pPr marL="0" indent="0">
-              <a:buNone/>
-            </a:pPr>
-            <a:r>
-              <a:rPr lang="en-US" sz="2800" dirty="0">
-                <a:latin typeface="Source Code Pro"/>
-                <a:cs typeface="Source Code Pro"/>
-              </a:rPr>
-              <a:t>  </a:t>
-            </a:r>
-            <a:r>
-              <a:rPr lang="en-US" sz="2800" dirty="0" smtClean="0">
-                <a:latin typeface="Source Code Pro"/>
-                <a:cs typeface="Source Code Pro"/>
-              </a:rPr>
-              <a:t>videoInfo.innerHTML </a:t>
-            </a:r>
-            <a:r>
-              <a:rPr lang="en-US" sz="2800" dirty="0">
-                <a:latin typeface="Source Code Pro"/>
-                <a:cs typeface="Source Code Pro"/>
-              </a:rPr>
-              <a:t>+= "&lt;p&gt;Duration: " + </a:t>
-            </a:r>
-            <a:r>
-              <a:rPr lang="en-US" sz="2800" b="1" dirty="0">
-                <a:latin typeface="Source Code Pro"/>
-                <a:cs typeface="Source Code Pro"/>
-              </a:rPr>
-              <a:t>duration</a:t>
-            </a:r>
-            <a:r>
-              <a:rPr lang="en-US" sz="2800" dirty="0">
-                <a:latin typeface="Source Code Pro"/>
-                <a:cs typeface="Source Code Pro"/>
-              </a:rPr>
-              <a:t> + "&lt;/p&gt;";</a:t>
-            </a:r>
-          </a:p>
-          <a:p>
-            <a:pPr marL="0" indent="0">
-              <a:buNone/>
-            </a:pPr>
-            <a:r>
-              <a:rPr lang="en-US" sz="2800" dirty="0" smtClean="0">
-                <a:latin typeface="Source Code Pro"/>
-                <a:cs typeface="Source Code Pro"/>
-              </a:rPr>
-              <a:t>}</a:t>
-            </a:r>
-            <a:r>
-              <a:rPr lang="en-US" sz="2800" dirty="0">
-                <a:latin typeface="Source Code Pro"/>
-                <a:cs typeface="Source Code Pro"/>
-              </a:rPr>
-              <a:t>);</a:t>
-            </a:r>
-          </a:p>
-          <a:p>
-            <a:pPr lvl="1"/>
             <a:endParaRPr lang="en-US" dirty="0"/>
           </a:p>
         </p:txBody>
@@ -6936,6 +7717,10 @@
               </a:pPr>
               <a:t>7</a:t>
             </a:fld>
+            <a:r>
+              <a:rPr lang="en-US" dirty="0" smtClean="0"/>
+              <a:t> </a:t>
+            </a:r>
             <a:endParaRPr lang="en-US" dirty="0"/>
           </a:p>
         </p:txBody>
@@ -6943,13 +7728,20 @@
     </p:spTree>
     <p:extLst>
       <p:ext uri="{BB962C8B-B14F-4D97-AF65-F5344CB8AC3E}">
-        <p14:creationId xmlns:p14="http://schemas.microsoft.com/office/powerpoint/2010/main" val="569581807"/>
+        <p14:creationId xmlns:p14="http://schemas.microsoft.com/office/powerpoint/2010/main" val="2910046734"/>
       </p:ext>
     </p:extLst>
   </p:cSld>
   <p:clrMapOvr>
     <a:masterClrMapping/>
   </p:clrMapOvr>
+  <p:timing>
+    <p:tnLst>
+      <p:par>
+        <p:cTn xmlns:p14="http://schemas.microsoft.com/office/powerpoint/2010/main" id="1" dur="indefinite" restart="never" nodeType="tmRoot"/>
+      </p:par>
+    </p:tnLst>
+  </p:timing>
 </p:sld>
 </file>
 
@@ -6972,12 +7764,12 @@
       </p:grpSpPr>
       <p:sp>
         <p:nvSpPr>
-          <p:cNvPr id="3" name="Text Placeholder 2"/>
-          <p:cNvSpPr>
-            <a:spLocks noGrp="1"/>
-          </p:cNvSpPr>
-          <p:nvPr>
-            <p:ph type="body" sz="quarter" idx="11"/>
+          <p:cNvPr id="2" name="Title 1"/>
+          <p:cNvSpPr>
+            <a:spLocks noGrp="1"/>
+          </p:cNvSpPr>
+          <p:nvPr>
+            <p:ph type="title"/>
           </p:nvPr>
         </p:nvSpPr>
         <p:spPr/>
@@ -6986,20 +7778,29 @@
           <a:lstStyle/>
           <a:p>
             <a:r>
-              <a:rPr lang="en-US" sz="4700" dirty="0"/>
-              <a:t>Thank you</a:t>
-            </a:r>
-          </a:p>
-        </p:txBody>
-      </p:sp>
-      <p:sp>
-        <p:nvSpPr>
-          <p:cNvPr id="5" name="Text Placeholder 4"/>
-          <p:cNvSpPr>
-            <a:spLocks noGrp="1"/>
-          </p:cNvSpPr>
-          <p:nvPr>
-            <p:ph type="body" sz="quarter" idx="12"/>
+              <a:rPr lang="en-US" dirty="0" smtClean="0"/>
+              <a:t>Build HTML with a Javascript </a:t>
+            </a:r>
+            <a:r>
+              <a:rPr lang="en-US" dirty="0" err="1" smtClean="0"/>
+              <a:t>Templating</a:t>
+            </a:r>
+            <a:r>
+              <a:rPr lang="en-US" dirty="0" smtClean="0"/>
+              <a:t> tool</a:t>
+            </a:r>
+            <a:endParaRPr lang="en-US" dirty="0"/>
+          </a:p>
+        </p:txBody>
+      </p:sp>
+      <p:sp>
+        <p:nvSpPr>
+          <p:cNvPr id="3" name="Content Placeholder 2"/>
+          <p:cNvSpPr>
+            <a:spLocks noGrp="1"/>
+          </p:cNvSpPr>
+          <p:nvPr>
+            <p:ph idx="1"/>
           </p:nvPr>
         </p:nvSpPr>
         <p:spPr/>
@@ -7008,10 +7809,273 @@
           <a:lstStyle/>
           <a:p>
             <a:r>
-              <a:rPr lang="en-US" dirty="0" smtClean="0"/>
-              <a:t>Brightcove Learning</a:t>
-            </a:r>
-            <a:endParaRPr lang="en-US" dirty="0"/>
+              <a:rPr lang="en-US" sz="3200" dirty="0" smtClean="0"/>
+              <a:t>Handlebars is an example </a:t>
+            </a:r>
+            <a:r>
+              <a:rPr lang="en-US" sz="3200" dirty="0" err="1" smtClean="0"/>
+              <a:t>templating</a:t>
+            </a:r>
+            <a:r>
+              <a:rPr lang="en-US" sz="3200" dirty="0"/>
+              <a:t> </a:t>
+            </a:r>
+            <a:r>
+              <a:rPr lang="en-US" sz="3200" dirty="0" smtClean="0"/>
+              <a:t>engine</a:t>
+            </a:r>
+          </a:p>
+          <a:p>
+            <a:pPr marL="485775" lvl="1" indent="0">
+              <a:buNone/>
+            </a:pPr>
+            <a:r>
+              <a:rPr lang="en-US" sz="3200" dirty="0">
+                <a:latin typeface="Source Code Pro"/>
+                <a:cs typeface="Source Code Pro"/>
+              </a:rPr>
+              <a:t>var </a:t>
+            </a:r>
+            <a:r>
+              <a:rPr lang="en-US" sz="3200" dirty="0" err="1">
+                <a:latin typeface="Source Code Pro"/>
+                <a:cs typeface="Source Code Pro"/>
+              </a:rPr>
+              <a:t>videoInfoTemplate</a:t>
+            </a:r>
+            <a:r>
+              <a:rPr lang="en-US" sz="3200" dirty="0">
+                <a:latin typeface="Source Code Pro"/>
+                <a:cs typeface="Source Code Pro"/>
+              </a:rPr>
+              <a:t> = "&lt;h3&gt;About this video&lt;/h3</a:t>
+            </a:r>
+            <a:r>
+              <a:rPr lang="en-US" sz="3200" dirty="0" smtClean="0">
+                <a:latin typeface="Source Code Pro"/>
+                <a:cs typeface="Source Code Pro"/>
+              </a:rPr>
+              <a:t>&gt;</a:t>
+            </a:r>
+            <a:br>
+              <a:rPr lang="en-US" sz="3200" dirty="0" smtClean="0">
+                <a:latin typeface="Source Code Pro"/>
+                <a:cs typeface="Source Code Pro"/>
+              </a:rPr>
+            </a:br>
+            <a:r>
+              <a:rPr lang="en-US" sz="3200" dirty="0" smtClean="0">
+                <a:latin typeface="Source Code Pro"/>
+                <a:cs typeface="Source Code Pro"/>
+              </a:rPr>
+              <a:t>  &lt;</a:t>
+            </a:r>
+            <a:r>
+              <a:rPr lang="en-US" sz="3200" dirty="0">
+                <a:latin typeface="Source Code Pro"/>
+                <a:cs typeface="Source Code Pro"/>
+              </a:rPr>
+              <a:t>h4&gt;Title: {{</a:t>
+            </a:r>
+            <a:r>
+              <a:rPr lang="en-US" sz="3200" dirty="0" err="1">
+                <a:latin typeface="Source Code Pro"/>
+                <a:cs typeface="Source Code Pro"/>
+              </a:rPr>
+              <a:t>displayName</a:t>
+            </a:r>
+            <a:r>
+              <a:rPr lang="en-US" sz="3200" dirty="0">
+                <a:latin typeface="Source Code Pro"/>
+                <a:cs typeface="Source Code Pro"/>
+              </a:rPr>
+              <a:t>}}&lt;/h4</a:t>
+            </a:r>
+            <a:r>
+              <a:rPr lang="en-US" sz="3200" dirty="0" smtClean="0">
+                <a:latin typeface="Source Code Pro"/>
+                <a:cs typeface="Source Code Pro"/>
+              </a:rPr>
+              <a:t>&gt;</a:t>
+            </a:r>
+            <a:br>
+              <a:rPr lang="en-US" sz="3200" dirty="0" smtClean="0">
+                <a:latin typeface="Source Code Pro"/>
+                <a:cs typeface="Source Code Pro"/>
+              </a:rPr>
+            </a:br>
+            <a:r>
+              <a:rPr lang="en-US" sz="3200" dirty="0" smtClean="0">
+                <a:latin typeface="Source Code Pro"/>
+                <a:cs typeface="Source Code Pro"/>
+              </a:rPr>
+              <a:t>  &lt;</a:t>
+            </a:r>
+            <a:r>
+              <a:rPr lang="en-US" sz="3200" dirty="0">
+                <a:latin typeface="Source Code Pro"/>
+                <a:cs typeface="Source Code Pro"/>
+              </a:rPr>
+              <a:t>p&gt;Description: {{</a:t>
+            </a:r>
+            <a:r>
+              <a:rPr lang="en-US" sz="3200" dirty="0" err="1">
+                <a:latin typeface="Source Code Pro"/>
+                <a:cs typeface="Source Code Pro"/>
+              </a:rPr>
+              <a:t>shortDescription</a:t>
+            </a:r>
+            <a:r>
+              <a:rPr lang="en-US" sz="3200" dirty="0">
+                <a:latin typeface="Source Code Pro"/>
+                <a:cs typeface="Source Code Pro"/>
+              </a:rPr>
+              <a:t>}}&lt;/p</a:t>
+            </a:r>
+            <a:r>
+              <a:rPr lang="en-US" sz="3200" dirty="0" smtClean="0">
+                <a:latin typeface="Source Code Pro"/>
+                <a:cs typeface="Source Code Pro"/>
+              </a:rPr>
+              <a:t>&gt;</a:t>
+            </a:r>
+            <a:br>
+              <a:rPr lang="en-US" sz="3200" dirty="0" smtClean="0">
+                <a:latin typeface="Source Code Pro"/>
+                <a:cs typeface="Source Code Pro"/>
+              </a:rPr>
+            </a:br>
+            <a:r>
+              <a:rPr lang="en-US" sz="3200" dirty="0" smtClean="0">
+                <a:latin typeface="Source Code Pro"/>
+                <a:cs typeface="Source Code Pro"/>
+              </a:rPr>
+              <a:t>  &lt;</a:t>
+            </a:r>
+            <a:r>
+              <a:rPr lang="en-US" sz="3200" dirty="0">
+                <a:latin typeface="Source Code Pro"/>
+                <a:cs typeface="Source Code Pro"/>
+              </a:rPr>
+              <a:t>p&gt;Tags:&lt;/p&gt;&lt;</a:t>
+            </a:r>
+            <a:r>
+              <a:rPr lang="en-US" sz="3200" dirty="0" err="1">
+                <a:latin typeface="Source Code Pro"/>
+                <a:cs typeface="Source Code Pro"/>
+              </a:rPr>
+              <a:t>ul</a:t>
+            </a:r>
+            <a:r>
+              <a:rPr lang="en-US" sz="3200" dirty="0">
+                <a:latin typeface="Source Code Pro"/>
+                <a:cs typeface="Source Code Pro"/>
+              </a:rPr>
+              <a:t>&gt;{{#tags}}&lt;li&gt;{{.}}&lt;/li&gt;{{/tags}}&lt;/</a:t>
+            </a:r>
+            <a:r>
+              <a:rPr lang="en-US" sz="3200" dirty="0" err="1">
+                <a:latin typeface="Source Code Pro"/>
+                <a:cs typeface="Source Code Pro"/>
+              </a:rPr>
+              <a:t>ul</a:t>
+            </a:r>
+            <a:r>
+              <a:rPr lang="en-US" sz="3200" dirty="0">
+                <a:latin typeface="Source Code Pro"/>
+                <a:cs typeface="Source Code Pro"/>
+              </a:rPr>
+              <a:t>&gt;";</a:t>
+            </a:r>
+          </a:p>
+          <a:p>
+            <a:pPr marL="485775" lvl="1" indent="0">
+              <a:buNone/>
+            </a:pPr>
+            <a:r>
+              <a:rPr lang="en-US" sz="3200" dirty="0">
+                <a:latin typeface="Source Code Pro"/>
+                <a:cs typeface="Source Code Pro"/>
+              </a:rPr>
+              <a:t>template = </a:t>
+            </a:r>
+            <a:r>
+              <a:rPr lang="en-US" sz="3200" dirty="0" err="1">
+                <a:latin typeface="Source Code Pro"/>
+                <a:cs typeface="Source Code Pro"/>
+              </a:rPr>
+              <a:t>Handlebars.compile</a:t>
+            </a:r>
+            <a:r>
+              <a:rPr lang="en-US" sz="3200" dirty="0">
+                <a:latin typeface="Source Code Pro"/>
+                <a:cs typeface="Source Code Pro"/>
+              </a:rPr>
+              <a:t>(</a:t>
+            </a:r>
+            <a:r>
+              <a:rPr lang="en-US" sz="3200" dirty="0" err="1">
+                <a:latin typeface="Source Code Pro"/>
+                <a:cs typeface="Source Code Pro"/>
+              </a:rPr>
+              <a:t>videoInfoTemplate</a:t>
+            </a:r>
+            <a:r>
+              <a:rPr lang="en-US" sz="3200" dirty="0">
+                <a:latin typeface="Source Code Pro"/>
+                <a:cs typeface="Source Code Pro"/>
+              </a:rPr>
+              <a:t>);</a:t>
+            </a:r>
+          </a:p>
+          <a:p>
+            <a:pPr marL="485775" lvl="1" indent="0">
+              <a:buNone/>
+            </a:pPr>
+            <a:r>
+              <a:rPr lang="en-US" sz="3200" dirty="0">
+                <a:latin typeface="Source Code Pro"/>
+                <a:cs typeface="Source Code Pro"/>
+              </a:rPr>
+              <a:t>results = template(videoDTO);</a:t>
+            </a:r>
+          </a:p>
+          <a:p>
+            <a:pPr marL="485775" lvl="1" indent="0">
+              <a:buNone/>
+            </a:pPr>
+            <a:r>
+              <a:rPr lang="en-US" sz="3200" dirty="0" err="1">
+                <a:latin typeface="Source Code Pro"/>
+                <a:cs typeface="Source Code Pro"/>
+              </a:rPr>
+              <a:t>displayInfo.innerHTML</a:t>
+            </a:r>
+            <a:r>
+              <a:rPr lang="en-US" sz="3200" dirty="0">
+                <a:latin typeface="Source Code Pro"/>
+                <a:cs typeface="Source Code Pro"/>
+              </a:rPr>
+              <a:t> = results;</a:t>
+            </a:r>
+          </a:p>
+          <a:p>
+            <a:pPr marL="485775" lvl="1" indent="0">
+              <a:buNone/>
+            </a:pPr>
+            <a:endParaRPr lang="en-US" sz="3200" dirty="0">
+              <a:latin typeface="Source Code Pro"/>
+              <a:cs typeface="Source Code Pro"/>
+            </a:endParaRPr>
+          </a:p>
+          <a:p>
+            <a:pPr marL="0" indent="0">
+              <a:buNone/>
+            </a:pPr>
+            <a:endParaRPr lang="en-US" sz="3200" dirty="0">
+              <a:latin typeface="Source Code Pro"/>
+              <a:cs typeface="Source Code Pro"/>
+            </a:endParaRPr>
           </a:p>
         </p:txBody>
       </p:sp>
@@ -7022,17 +8086,14 @@
             <a:spLocks noGrp="1"/>
           </p:cNvSpPr>
           <p:nvPr>
-            <p:ph type="sldNum" sz="quarter" idx="4294967295"/>
+            <p:ph type="sldNum" sz="quarter" idx="10"/>
           </p:nvPr>
         </p:nvSpPr>
         <p:spPr>
           <a:xfrm>
-            <a:off x="1" y="9253119"/>
-            <a:ext cx="812230" cy="403878"/>
+            <a:off x="614210" y="9242425"/>
+            <a:ext cx="676275" cy="519113"/>
           </a:xfrm>
-          <a:prstGeom prst="rect">
-            <a:avLst/>
-          </a:prstGeom>
         </p:spPr>
         <p:txBody>
           <a:bodyPr/>
@@ -7041,13 +8102,17 @@
             <a:pPr>
               <a:defRPr/>
             </a:pPr>
-            <a:fld id="{E089BD15-BC77-46D6-86B9-64976AF1A8F1}" type="slidenum">
+            <a:fld id="{3BEB2E47-3EB2-7B4C-8CBB-96C276A0FE3D}" type="slidenum">
               <a:rPr lang="en-US" smtClean="0"/>
               <a:pPr>
                 <a:defRPr/>
               </a:pPr>
               <a:t>8</a:t>
             </a:fld>
+            <a:r>
+              <a:rPr lang="en-US" dirty="0" smtClean="0"/>
+              <a:t> </a:t>
+            </a:r>
             <a:endParaRPr lang="en-US" dirty="0"/>
           </a:p>
         </p:txBody>
@@ -7055,16 +8120,273 @@
     </p:spTree>
     <p:extLst>
       <p:ext uri="{BB962C8B-B14F-4D97-AF65-F5344CB8AC3E}">
-        <p14:creationId xmlns:p14="http://schemas.microsoft.com/office/powerpoint/2010/main" val="3700295984"/>
+        <p14:creationId xmlns:p14="http://schemas.microsoft.com/office/powerpoint/2010/main" val="2341643841"/>
       </p:ext>
     </p:extLst>
   </p:cSld>
   <p:clrMapOvr>
     <a:masterClrMapping/>
   </p:clrMapOvr>
-  <p:transition xmlns:p14="http://schemas.microsoft.com/office/powerpoint/2010/main" spd="med">
-    <p:fade/>
-  </p:transition>
+  <p:timing>
+    <p:tnLst>
+      <p:par>
+        <p:cTn xmlns:p14="http://schemas.microsoft.com/office/powerpoint/2010/main" id="1" dur="indefinite" restart="never" nodeType="tmRoot"/>
+      </p:par>
+    </p:tnLst>
+  </p:timing>
+</p:sld>
+</file>
+
+<file path=ppt/slides/slide9.xml><?xml version="1.0" encoding="utf-8"?>
+<p:sld xmlns:a="http://schemas.openxmlformats.org/drawingml/2006/main" xmlns:r="http://schemas.openxmlformats.org/officeDocument/2006/relationships" xmlns:p="http://schemas.openxmlformats.org/presentationml/2006/main">
+  <p:cSld>
+    <p:spTree>
+      <p:nvGrpSpPr>
+        <p:cNvPr id="1" name=""/>
+        <p:cNvGrpSpPr/>
+        <p:nvPr/>
+      </p:nvGrpSpPr>
+      <p:grpSpPr>
+        <a:xfrm>
+          <a:off x="0" y="0"/>
+          <a:ext cx="0" cy="0"/>
+          <a:chOff x="0" y="0"/>
+          <a:chExt cx="0" cy="0"/>
+        </a:xfrm>
+      </p:grpSpPr>
+      <p:sp>
+        <p:nvSpPr>
+          <p:cNvPr id="2" name="Title 1"/>
+          <p:cNvSpPr>
+            <a:spLocks noGrp="1"/>
+          </p:cNvSpPr>
+          <p:nvPr>
+            <p:ph type="title"/>
+          </p:nvPr>
+        </p:nvSpPr>
+        <p:spPr/>
+        <p:txBody>
+          <a:bodyPr/>
+          <a:lstStyle/>
+          <a:p>
+            <a:r>
+              <a:rPr lang="en-US" dirty="0" smtClean="0"/>
+              <a:t>Getting the Video Duration</a:t>
+            </a:r>
+            <a:endParaRPr lang="en-US" dirty="0"/>
+          </a:p>
+        </p:txBody>
+      </p:sp>
+      <p:sp>
+        <p:nvSpPr>
+          <p:cNvPr id="3" name="Content Placeholder 2"/>
+          <p:cNvSpPr>
+            <a:spLocks noGrp="1"/>
+          </p:cNvSpPr>
+          <p:nvPr>
+            <p:ph idx="1"/>
+          </p:nvPr>
+        </p:nvSpPr>
+        <p:spPr/>
+        <p:txBody>
+          <a:bodyPr/>
+          <a:lstStyle/>
+          <a:p>
+            <a:r>
+              <a:rPr lang="en-US" sz="3200" dirty="0" smtClean="0"/>
+              <a:t>Another VIDEO_PLAYER module method: </a:t>
+            </a:r>
+            <a:br>
+              <a:rPr lang="en-US" sz="3200" dirty="0" smtClean="0"/>
+            </a:br>
+            <a:r>
+              <a:rPr lang="en-US" sz="3200" dirty="0" smtClean="0"/>
+              <a:t>  </a:t>
+            </a:r>
+            <a:r>
+              <a:rPr lang="en-US" sz="3200" dirty="0" err="1" smtClean="0">
+                <a:latin typeface="Source Code Pro"/>
+                <a:cs typeface="Source Code Pro"/>
+              </a:rPr>
+              <a:t>getVideoDuration</a:t>
+            </a:r>
+            <a:r>
+              <a:rPr lang="en-US" sz="3200" dirty="0" smtClean="0">
+                <a:latin typeface="Source Code Pro"/>
+                <a:cs typeface="Source Code Pro"/>
+              </a:rPr>
+              <a:t>(formatted, callback)</a:t>
+            </a:r>
+          </a:p>
+          <a:p>
+            <a:pPr lvl="1"/>
+            <a:r>
+              <a:rPr lang="en-US" sz="3200" dirty="0" smtClean="0"/>
+              <a:t>The video length is in the DTO, but as milliseconds – this method gives you a nicely formatted version</a:t>
+            </a:r>
+          </a:p>
+          <a:p>
+            <a:pPr lvl="1"/>
+            <a:endParaRPr lang="en-US" dirty="0"/>
+          </a:p>
+          <a:p>
+            <a:pPr marL="0" indent="0">
+              <a:buNone/>
+            </a:pPr>
+            <a:r>
+              <a:rPr lang="en-US" sz="3200" dirty="0">
+                <a:latin typeface="Source Code Pro"/>
+                <a:cs typeface="Source Code Pro"/>
+              </a:rPr>
+              <a:t>videoPlayer.</a:t>
+            </a:r>
+            <a:r>
+              <a:rPr lang="en-US" sz="3200" b="1" dirty="0">
+                <a:latin typeface="Source Code Pro"/>
+                <a:cs typeface="Source Code Pro"/>
+              </a:rPr>
+              <a:t>getVideoDuration</a:t>
+            </a:r>
+            <a:r>
+              <a:rPr lang="en-US" sz="3200" dirty="0">
+                <a:latin typeface="Source Code Pro"/>
+                <a:cs typeface="Source Code Pro"/>
+              </a:rPr>
+              <a:t>( </a:t>
+            </a:r>
+            <a:r>
+              <a:rPr lang="en-US" sz="3200" b="1" dirty="0">
+                <a:latin typeface="Source Code Pro"/>
+                <a:cs typeface="Source Code Pro"/>
+              </a:rPr>
+              <a:t>true</a:t>
+            </a:r>
+            <a:r>
+              <a:rPr lang="en-US" sz="3200" dirty="0">
+                <a:latin typeface="Source Code Pro"/>
+                <a:cs typeface="Source Code Pro"/>
+              </a:rPr>
+              <a:t>, function(</a:t>
+            </a:r>
+            <a:r>
+              <a:rPr lang="en-US" sz="3200" b="1" dirty="0">
+                <a:latin typeface="Source Code Pro"/>
+                <a:cs typeface="Source Code Pro"/>
+              </a:rPr>
+              <a:t>duration</a:t>
+            </a:r>
+            <a:r>
+              <a:rPr lang="en-US" sz="3200" dirty="0">
+                <a:latin typeface="Source Code Pro"/>
+                <a:cs typeface="Source Code Pro"/>
+              </a:rPr>
+              <a:t>) {</a:t>
+            </a:r>
+          </a:p>
+          <a:p>
+            <a:pPr marL="0" indent="0">
+              <a:buNone/>
+            </a:pPr>
+            <a:r>
+              <a:rPr lang="en-US" sz="3200" dirty="0">
+                <a:latin typeface="Source Code Pro"/>
+                <a:cs typeface="Source Code Pro"/>
+              </a:rPr>
+              <a:t>  </a:t>
+            </a:r>
+            <a:r>
+              <a:rPr lang="en-US" sz="3200" dirty="0" smtClean="0">
+                <a:latin typeface="Source Code Pro"/>
+                <a:cs typeface="Source Code Pro"/>
+              </a:rPr>
+              <a:t>videoInfo.innerHTML </a:t>
+            </a:r>
+            <a:r>
+              <a:rPr lang="en-US" sz="3200" dirty="0">
+                <a:latin typeface="Source Code Pro"/>
+                <a:cs typeface="Source Code Pro"/>
+              </a:rPr>
+              <a:t>+= "&lt;p&gt;Duration: " + </a:t>
+            </a:r>
+            <a:r>
+              <a:rPr lang="en-US" sz="3200" b="1" dirty="0">
+                <a:latin typeface="Source Code Pro"/>
+                <a:cs typeface="Source Code Pro"/>
+              </a:rPr>
+              <a:t>duration</a:t>
+            </a:r>
+            <a:r>
+              <a:rPr lang="en-US" sz="3200" dirty="0">
+                <a:latin typeface="Source Code Pro"/>
+                <a:cs typeface="Source Code Pro"/>
+              </a:rPr>
+              <a:t> + "&lt;/p&gt;";</a:t>
+            </a:r>
+          </a:p>
+          <a:p>
+            <a:pPr marL="0" indent="0">
+              <a:buNone/>
+            </a:pPr>
+            <a:r>
+              <a:rPr lang="en-US" sz="3200" dirty="0" smtClean="0">
+                <a:latin typeface="Source Code Pro"/>
+                <a:cs typeface="Source Code Pro"/>
+              </a:rPr>
+              <a:t>}</a:t>
+            </a:r>
+            <a:r>
+              <a:rPr lang="en-US" sz="3200" dirty="0">
+                <a:latin typeface="Source Code Pro"/>
+                <a:cs typeface="Source Code Pro"/>
+              </a:rPr>
+              <a:t>);</a:t>
+            </a:r>
+          </a:p>
+          <a:p>
+            <a:pPr lvl="1"/>
+            <a:endParaRPr lang="en-US" dirty="0"/>
+          </a:p>
+        </p:txBody>
+      </p:sp>
+      <p:sp>
+        <p:nvSpPr>
+          <p:cNvPr id="4" name="Slide Number Placeholder 3"/>
+          <p:cNvSpPr>
+            <a:spLocks noGrp="1"/>
+          </p:cNvSpPr>
+          <p:nvPr>
+            <p:ph type="sldNum" sz="quarter" idx="10"/>
+          </p:nvPr>
+        </p:nvSpPr>
+        <p:spPr/>
+        <p:txBody>
+          <a:bodyPr/>
+          <a:lstStyle/>
+          <a:p>
+            <a:pPr>
+              <a:defRPr/>
+            </a:pPr>
+            <a:fld id="{3BEB2E47-3EB2-7B4C-8CBB-96C276A0FE3D}" type="slidenum">
+              <a:rPr lang="en-US" smtClean="0"/>
+              <a:pPr>
+                <a:defRPr/>
+              </a:pPr>
+              <a:t>9</a:t>
+            </a:fld>
+            <a:endParaRPr lang="en-US" dirty="0"/>
+          </a:p>
+        </p:txBody>
+      </p:sp>
+    </p:spTree>
+    <p:extLst>
+      <p:ext uri="{BB962C8B-B14F-4D97-AF65-F5344CB8AC3E}">
+        <p14:creationId xmlns:p14="http://schemas.microsoft.com/office/powerpoint/2010/main" val="569581807"/>
+      </p:ext>
+    </p:extLst>
+  </p:cSld>
+  <p:clrMapOvr>
+    <a:masterClrMapping/>
+  </p:clrMapOvr>
   <p:timing>
     <p:tnLst>
       <p:par>

</xml_diff>